<commit_message>
Commit - 2nd Day
</commit_message>
<xml_diff>
--- a/Overview/Bank Loan PPT Power BI.pptx
+++ b/Overview/Bank Loan PPT Power BI.pptx
@@ -150,7 +150,7 @@
           <p:cNvPr id="2" name="Title 1">
             <a:extLst>
               <a:ext uri="{FF2B5EF4-FFF2-40B4-BE49-F238E27FC236}">
-                <a16:creationId xmlns:a16="http://schemas.microsoft.com/office/drawing/2014/main" id="{820CDBFA-3603-645A-9EB2-BF18E33B1A06}"/>
+                <a16:creationId xmlns="" xmlns:a16="http://schemas.microsoft.com/office/drawing/2014/main" id="{820CDBFA-3603-645A-9EB2-BF18E33B1A06}"/>
               </a:ext>
             </a:extLst>
           </p:cNvPr>
@@ -188,7 +188,7 @@
           <p:cNvPr id="3" name="Subtitle 2">
             <a:extLst>
               <a:ext uri="{FF2B5EF4-FFF2-40B4-BE49-F238E27FC236}">
-                <a16:creationId xmlns:a16="http://schemas.microsoft.com/office/drawing/2014/main" id="{623B8327-55E4-1536-B4F6-FBD74A1753EC}"/>
+                <a16:creationId xmlns="" xmlns:a16="http://schemas.microsoft.com/office/drawing/2014/main" id="{623B8327-55E4-1536-B4F6-FBD74A1753EC}"/>
               </a:ext>
             </a:extLst>
           </p:cNvPr>
@@ -259,7 +259,7 @@
           <p:cNvPr id="4" name="Date Placeholder 3">
             <a:extLst>
               <a:ext uri="{FF2B5EF4-FFF2-40B4-BE49-F238E27FC236}">
-                <a16:creationId xmlns:a16="http://schemas.microsoft.com/office/drawing/2014/main" id="{F715BB0C-9460-BD86-EFB3-AB6659C26DE0}"/>
+                <a16:creationId xmlns="" xmlns:a16="http://schemas.microsoft.com/office/drawing/2014/main" id="{F715BB0C-9460-BD86-EFB3-AB6659C26DE0}"/>
               </a:ext>
             </a:extLst>
           </p:cNvPr>
@@ -277,7 +277,7 @@
           <a:p>
             <a:fld id="{7B289A56-B7BF-4EE2-A684-7373F14AFF3B}" type="datetimeFigureOut">
               <a:rPr lang="en-IN" smtClean="0"/>
-              <a:t>07-10-2023</a:t>
+              <a:t>25-12-2025</a:t>
             </a:fld>
             <a:endParaRPr lang="en-IN"/>
           </a:p>
@@ -288,7 +288,7 @@
           <p:cNvPr id="5" name="Footer Placeholder 4">
             <a:extLst>
               <a:ext uri="{FF2B5EF4-FFF2-40B4-BE49-F238E27FC236}">
-                <a16:creationId xmlns:a16="http://schemas.microsoft.com/office/drawing/2014/main" id="{302C60DD-6F9A-8C55-2C9B-5C4E70AD6AD0}"/>
+                <a16:creationId xmlns="" xmlns:a16="http://schemas.microsoft.com/office/drawing/2014/main" id="{302C60DD-6F9A-8C55-2C9B-5C4E70AD6AD0}"/>
               </a:ext>
             </a:extLst>
           </p:cNvPr>
@@ -313,7 +313,7 @@
           <p:cNvPr id="6" name="Slide Number Placeholder 5">
             <a:extLst>
               <a:ext uri="{FF2B5EF4-FFF2-40B4-BE49-F238E27FC236}">
-                <a16:creationId xmlns:a16="http://schemas.microsoft.com/office/drawing/2014/main" id="{C3D434C2-C539-549B-C05C-B98518AC5860}"/>
+                <a16:creationId xmlns="" xmlns:a16="http://schemas.microsoft.com/office/drawing/2014/main" id="{C3D434C2-C539-549B-C05C-B98518AC5860}"/>
               </a:ext>
             </a:extLst>
           </p:cNvPr>
@@ -372,7 +372,7 @@
           <p:cNvPr id="2" name="Title 1">
             <a:extLst>
               <a:ext uri="{FF2B5EF4-FFF2-40B4-BE49-F238E27FC236}">
-                <a16:creationId xmlns:a16="http://schemas.microsoft.com/office/drawing/2014/main" id="{F8BC7D78-8517-28DA-A27A-D8FFDBD25017}"/>
+                <a16:creationId xmlns="" xmlns:a16="http://schemas.microsoft.com/office/drawing/2014/main" id="{F8BC7D78-8517-28DA-A27A-D8FFDBD25017}"/>
               </a:ext>
             </a:extLst>
           </p:cNvPr>
@@ -401,7 +401,7 @@
           <p:cNvPr id="3" name="Vertical Text Placeholder 2">
             <a:extLst>
               <a:ext uri="{FF2B5EF4-FFF2-40B4-BE49-F238E27FC236}">
-                <a16:creationId xmlns:a16="http://schemas.microsoft.com/office/drawing/2014/main" id="{DE0457C4-E215-0637-C3AF-8C3D1FCBF2F5}"/>
+                <a16:creationId xmlns="" xmlns:a16="http://schemas.microsoft.com/office/drawing/2014/main" id="{DE0457C4-E215-0637-C3AF-8C3D1FCBF2F5}"/>
               </a:ext>
             </a:extLst>
           </p:cNvPr>
@@ -459,7 +459,7 @@
           <p:cNvPr id="4" name="Date Placeholder 3">
             <a:extLst>
               <a:ext uri="{FF2B5EF4-FFF2-40B4-BE49-F238E27FC236}">
-                <a16:creationId xmlns:a16="http://schemas.microsoft.com/office/drawing/2014/main" id="{70202C78-9EFE-DF28-A614-944782ADBFAD}"/>
+                <a16:creationId xmlns="" xmlns:a16="http://schemas.microsoft.com/office/drawing/2014/main" id="{70202C78-9EFE-DF28-A614-944782ADBFAD}"/>
               </a:ext>
             </a:extLst>
           </p:cNvPr>
@@ -477,7 +477,7 @@
           <a:p>
             <a:fld id="{7B289A56-B7BF-4EE2-A684-7373F14AFF3B}" type="datetimeFigureOut">
               <a:rPr lang="en-IN" smtClean="0"/>
-              <a:t>07-10-2023</a:t>
+              <a:t>25-12-2025</a:t>
             </a:fld>
             <a:endParaRPr lang="en-IN"/>
           </a:p>
@@ -488,7 +488,7 @@
           <p:cNvPr id="5" name="Footer Placeholder 4">
             <a:extLst>
               <a:ext uri="{FF2B5EF4-FFF2-40B4-BE49-F238E27FC236}">
-                <a16:creationId xmlns:a16="http://schemas.microsoft.com/office/drawing/2014/main" id="{A01652D1-928F-44A9-D700-AA5F4C04F834}"/>
+                <a16:creationId xmlns="" xmlns:a16="http://schemas.microsoft.com/office/drawing/2014/main" id="{A01652D1-928F-44A9-D700-AA5F4C04F834}"/>
               </a:ext>
             </a:extLst>
           </p:cNvPr>
@@ -513,7 +513,7 @@
           <p:cNvPr id="6" name="Slide Number Placeholder 5">
             <a:extLst>
               <a:ext uri="{FF2B5EF4-FFF2-40B4-BE49-F238E27FC236}">
-                <a16:creationId xmlns:a16="http://schemas.microsoft.com/office/drawing/2014/main" id="{7E23B83E-DE60-62A4-DDC6-0166638EFBB9}"/>
+                <a16:creationId xmlns="" xmlns:a16="http://schemas.microsoft.com/office/drawing/2014/main" id="{7E23B83E-DE60-62A4-DDC6-0166638EFBB9}"/>
               </a:ext>
             </a:extLst>
           </p:cNvPr>
@@ -572,7 +572,7 @@
           <p:cNvPr id="2" name="Vertical Title 1">
             <a:extLst>
               <a:ext uri="{FF2B5EF4-FFF2-40B4-BE49-F238E27FC236}">
-                <a16:creationId xmlns:a16="http://schemas.microsoft.com/office/drawing/2014/main" id="{6C2510F1-7BC3-31D7-0266-19EAE7F79718}"/>
+                <a16:creationId xmlns="" xmlns:a16="http://schemas.microsoft.com/office/drawing/2014/main" id="{6C2510F1-7BC3-31D7-0266-19EAE7F79718}"/>
               </a:ext>
             </a:extLst>
           </p:cNvPr>
@@ -606,7 +606,7 @@
           <p:cNvPr id="3" name="Vertical Text Placeholder 2">
             <a:extLst>
               <a:ext uri="{FF2B5EF4-FFF2-40B4-BE49-F238E27FC236}">
-                <a16:creationId xmlns:a16="http://schemas.microsoft.com/office/drawing/2014/main" id="{89A19C68-55AF-AAF3-C65B-31A5C1D0EB0B}"/>
+                <a16:creationId xmlns="" xmlns:a16="http://schemas.microsoft.com/office/drawing/2014/main" id="{89A19C68-55AF-AAF3-C65B-31A5C1D0EB0B}"/>
               </a:ext>
             </a:extLst>
           </p:cNvPr>
@@ -669,7 +669,7 @@
           <p:cNvPr id="4" name="Date Placeholder 3">
             <a:extLst>
               <a:ext uri="{FF2B5EF4-FFF2-40B4-BE49-F238E27FC236}">
-                <a16:creationId xmlns:a16="http://schemas.microsoft.com/office/drawing/2014/main" id="{532AE636-CB51-D73D-DDB9-04342DEBA867}"/>
+                <a16:creationId xmlns="" xmlns:a16="http://schemas.microsoft.com/office/drawing/2014/main" id="{532AE636-CB51-D73D-DDB9-04342DEBA867}"/>
               </a:ext>
             </a:extLst>
           </p:cNvPr>
@@ -687,7 +687,7 @@
           <a:p>
             <a:fld id="{7B289A56-B7BF-4EE2-A684-7373F14AFF3B}" type="datetimeFigureOut">
               <a:rPr lang="en-IN" smtClean="0"/>
-              <a:t>07-10-2023</a:t>
+              <a:t>25-12-2025</a:t>
             </a:fld>
             <a:endParaRPr lang="en-IN"/>
           </a:p>
@@ -698,7 +698,7 @@
           <p:cNvPr id="5" name="Footer Placeholder 4">
             <a:extLst>
               <a:ext uri="{FF2B5EF4-FFF2-40B4-BE49-F238E27FC236}">
-                <a16:creationId xmlns:a16="http://schemas.microsoft.com/office/drawing/2014/main" id="{24ABDAD9-6500-E41D-1CBB-7FC9126F688B}"/>
+                <a16:creationId xmlns="" xmlns:a16="http://schemas.microsoft.com/office/drawing/2014/main" id="{24ABDAD9-6500-E41D-1CBB-7FC9126F688B}"/>
               </a:ext>
             </a:extLst>
           </p:cNvPr>
@@ -723,7 +723,7 @@
           <p:cNvPr id="6" name="Slide Number Placeholder 5">
             <a:extLst>
               <a:ext uri="{FF2B5EF4-FFF2-40B4-BE49-F238E27FC236}">
-                <a16:creationId xmlns:a16="http://schemas.microsoft.com/office/drawing/2014/main" id="{1C568266-F247-C64C-3559-6A0C24440CE4}"/>
+                <a16:creationId xmlns="" xmlns:a16="http://schemas.microsoft.com/office/drawing/2014/main" id="{1C568266-F247-C64C-3559-6A0C24440CE4}"/>
               </a:ext>
             </a:extLst>
           </p:cNvPr>
@@ -782,7 +782,7 @@
           <p:cNvPr id="2" name="Title 1">
             <a:extLst>
               <a:ext uri="{FF2B5EF4-FFF2-40B4-BE49-F238E27FC236}">
-                <a16:creationId xmlns:a16="http://schemas.microsoft.com/office/drawing/2014/main" id="{7D661F88-B833-1200-D3CF-EE837B0825B8}"/>
+                <a16:creationId xmlns="" xmlns:a16="http://schemas.microsoft.com/office/drawing/2014/main" id="{7D661F88-B833-1200-D3CF-EE837B0825B8}"/>
               </a:ext>
             </a:extLst>
           </p:cNvPr>
@@ -811,7 +811,7 @@
           <p:cNvPr id="3" name="Content Placeholder 2">
             <a:extLst>
               <a:ext uri="{FF2B5EF4-FFF2-40B4-BE49-F238E27FC236}">
-                <a16:creationId xmlns:a16="http://schemas.microsoft.com/office/drawing/2014/main" id="{9CC8CB8E-71BD-E0B3-64CF-7417B33BCE6E}"/>
+                <a16:creationId xmlns="" xmlns:a16="http://schemas.microsoft.com/office/drawing/2014/main" id="{9CC8CB8E-71BD-E0B3-64CF-7417B33BCE6E}"/>
               </a:ext>
             </a:extLst>
           </p:cNvPr>
@@ -869,7 +869,7 @@
           <p:cNvPr id="4" name="Date Placeholder 3">
             <a:extLst>
               <a:ext uri="{FF2B5EF4-FFF2-40B4-BE49-F238E27FC236}">
-                <a16:creationId xmlns:a16="http://schemas.microsoft.com/office/drawing/2014/main" id="{927AA232-E33E-8A21-389D-F57473CF39A9}"/>
+                <a16:creationId xmlns="" xmlns:a16="http://schemas.microsoft.com/office/drawing/2014/main" id="{927AA232-E33E-8A21-389D-F57473CF39A9}"/>
               </a:ext>
             </a:extLst>
           </p:cNvPr>
@@ -887,7 +887,7 @@
           <a:p>
             <a:fld id="{7B289A56-B7BF-4EE2-A684-7373F14AFF3B}" type="datetimeFigureOut">
               <a:rPr lang="en-IN" smtClean="0"/>
-              <a:t>07-10-2023</a:t>
+              <a:t>25-12-2025</a:t>
             </a:fld>
             <a:endParaRPr lang="en-IN"/>
           </a:p>
@@ -898,7 +898,7 @@
           <p:cNvPr id="5" name="Footer Placeholder 4">
             <a:extLst>
               <a:ext uri="{FF2B5EF4-FFF2-40B4-BE49-F238E27FC236}">
-                <a16:creationId xmlns:a16="http://schemas.microsoft.com/office/drawing/2014/main" id="{033C86FC-555E-1772-0A31-2E81D8C8475A}"/>
+                <a16:creationId xmlns="" xmlns:a16="http://schemas.microsoft.com/office/drawing/2014/main" id="{033C86FC-555E-1772-0A31-2E81D8C8475A}"/>
               </a:ext>
             </a:extLst>
           </p:cNvPr>
@@ -923,7 +923,7 @@
           <p:cNvPr id="6" name="Slide Number Placeholder 5">
             <a:extLst>
               <a:ext uri="{FF2B5EF4-FFF2-40B4-BE49-F238E27FC236}">
-                <a16:creationId xmlns:a16="http://schemas.microsoft.com/office/drawing/2014/main" id="{A4983072-3545-FC11-E0FE-8FC24CF2E220}"/>
+                <a16:creationId xmlns="" xmlns:a16="http://schemas.microsoft.com/office/drawing/2014/main" id="{A4983072-3545-FC11-E0FE-8FC24CF2E220}"/>
               </a:ext>
             </a:extLst>
           </p:cNvPr>
@@ -982,7 +982,7 @@
           <p:cNvPr id="2" name="Title 1">
             <a:extLst>
               <a:ext uri="{FF2B5EF4-FFF2-40B4-BE49-F238E27FC236}">
-                <a16:creationId xmlns:a16="http://schemas.microsoft.com/office/drawing/2014/main" id="{BE07C800-8FF8-1209-480E-6D31FB4B1651}"/>
+                <a16:creationId xmlns="" xmlns:a16="http://schemas.microsoft.com/office/drawing/2014/main" id="{BE07C800-8FF8-1209-480E-6D31FB4B1651}"/>
               </a:ext>
             </a:extLst>
           </p:cNvPr>
@@ -1020,7 +1020,7 @@
           <p:cNvPr id="3" name="Text Placeholder 2">
             <a:extLst>
               <a:ext uri="{FF2B5EF4-FFF2-40B4-BE49-F238E27FC236}">
-                <a16:creationId xmlns:a16="http://schemas.microsoft.com/office/drawing/2014/main" id="{4BA770BE-4704-DD13-E41C-FDF47C5AC46A}"/>
+                <a16:creationId xmlns="" xmlns:a16="http://schemas.microsoft.com/office/drawing/2014/main" id="{4BA770BE-4704-DD13-E41C-FDF47C5AC46A}"/>
               </a:ext>
             </a:extLst>
           </p:cNvPr>
@@ -1145,7 +1145,7 @@
           <p:cNvPr id="4" name="Date Placeholder 3">
             <a:extLst>
               <a:ext uri="{FF2B5EF4-FFF2-40B4-BE49-F238E27FC236}">
-                <a16:creationId xmlns:a16="http://schemas.microsoft.com/office/drawing/2014/main" id="{1CAB303D-4232-4156-EED1-1723C75B0ABD}"/>
+                <a16:creationId xmlns="" xmlns:a16="http://schemas.microsoft.com/office/drawing/2014/main" id="{1CAB303D-4232-4156-EED1-1723C75B0ABD}"/>
               </a:ext>
             </a:extLst>
           </p:cNvPr>
@@ -1163,7 +1163,7 @@
           <a:p>
             <a:fld id="{7B289A56-B7BF-4EE2-A684-7373F14AFF3B}" type="datetimeFigureOut">
               <a:rPr lang="en-IN" smtClean="0"/>
-              <a:t>07-10-2023</a:t>
+              <a:t>25-12-2025</a:t>
             </a:fld>
             <a:endParaRPr lang="en-IN"/>
           </a:p>
@@ -1174,7 +1174,7 @@
           <p:cNvPr id="5" name="Footer Placeholder 4">
             <a:extLst>
               <a:ext uri="{FF2B5EF4-FFF2-40B4-BE49-F238E27FC236}">
-                <a16:creationId xmlns:a16="http://schemas.microsoft.com/office/drawing/2014/main" id="{674DEFFC-4535-7746-363E-449CCC413064}"/>
+                <a16:creationId xmlns="" xmlns:a16="http://schemas.microsoft.com/office/drawing/2014/main" id="{674DEFFC-4535-7746-363E-449CCC413064}"/>
               </a:ext>
             </a:extLst>
           </p:cNvPr>
@@ -1199,7 +1199,7 @@
           <p:cNvPr id="6" name="Slide Number Placeholder 5">
             <a:extLst>
               <a:ext uri="{FF2B5EF4-FFF2-40B4-BE49-F238E27FC236}">
-                <a16:creationId xmlns:a16="http://schemas.microsoft.com/office/drawing/2014/main" id="{B23B1815-6E61-12F0-67C6-5391B7A7EA22}"/>
+                <a16:creationId xmlns="" xmlns:a16="http://schemas.microsoft.com/office/drawing/2014/main" id="{B23B1815-6E61-12F0-67C6-5391B7A7EA22}"/>
               </a:ext>
             </a:extLst>
           </p:cNvPr>
@@ -1258,7 +1258,7 @@
           <p:cNvPr id="2" name="Title 1">
             <a:extLst>
               <a:ext uri="{FF2B5EF4-FFF2-40B4-BE49-F238E27FC236}">
-                <a16:creationId xmlns:a16="http://schemas.microsoft.com/office/drawing/2014/main" id="{F71973CA-2221-B6BA-247A-67888D17E141}"/>
+                <a16:creationId xmlns="" xmlns:a16="http://schemas.microsoft.com/office/drawing/2014/main" id="{F71973CA-2221-B6BA-247A-67888D17E141}"/>
               </a:ext>
             </a:extLst>
           </p:cNvPr>
@@ -1287,7 +1287,7 @@
           <p:cNvPr id="3" name="Content Placeholder 2">
             <a:extLst>
               <a:ext uri="{FF2B5EF4-FFF2-40B4-BE49-F238E27FC236}">
-                <a16:creationId xmlns:a16="http://schemas.microsoft.com/office/drawing/2014/main" id="{D8A66AE0-2950-2E07-2ADF-40ECF430F5B4}"/>
+                <a16:creationId xmlns="" xmlns:a16="http://schemas.microsoft.com/office/drawing/2014/main" id="{D8A66AE0-2950-2E07-2ADF-40ECF430F5B4}"/>
               </a:ext>
             </a:extLst>
           </p:cNvPr>
@@ -1350,7 +1350,7 @@
           <p:cNvPr id="4" name="Content Placeholder 3">
             <a:extLst>
               <a:ext uri="{FF2B5EF4-FFF2-40B4-BE49-F238E27FC236}">
-                <a16:creationId xmlns:a16="http://schemas.microsoft.com/office/drawing/2014/main" id="{5B1802A0-C2B1-90B6-E2F4-4DA17A2E1DDC}"/>
+                <a16:creationId xmlns="" xmlns:a16="http://schemas.microsoft.com/office/drawing/2014/main" id="{5B1802A0-C2B1-90B6-E2F4-4DA17A2E1DDC}"/>
               </a:ext>
             </a:extLst>
           </p:cNvPr>
@@ -1413,7 +1413,7 @@
           <p:cNvPr id="5" name="Date Placeholder 4">
             <a:extLst>
               <a:ext uri="{FF2B5EF4-FFF2-40B4-BE49-F238E27FC236}">
-                <a16:creationId xmlns:a16="http://schemas.microsoft.com/office/drawing/2014/main" id="{21FC01AE-CCB7-63D9-CBBB-F645B0F4EA84}"/>
+                <a16:creationId xmlns="" xmlns:a16="http://schemas.microsoft.com/office/drawing/2014/main" id="{21FC01AE-CCB7-63D9-CBBB-F645B0F4EA84}"/>
               </a:ext>
             </a:extLst>
           </p:cNvPr>
@@ -1431,7 +1431,7 @@
           <a:p>
             <a:fld id="{7B289A56-B7BF-4EE2-A684-7373F14AFF3B}" type="datetimeFigureOut">
               <a:rPr lang="en-IN" smtClean="0"/>
-              <a:t>07-10-2023</a:t>
+              <a:t>25-12-2025</a:t>
             </a:fld>
             <a:endParaRPr lang="en-IN"/>
           </a:p>
@@ -1442,7 +1442,7 @@
           <p:cNvPr id="6" name="Footer Placeholder 5">
             <a:extLst>
               <a:ext uri="{FF2B5EF4-FFF2-40B4-BE49-F238E27FC236}">
-                <a16:creationId xmlns:a16="http://schemas.microsoft.com/office/drawing/2014/main" id="{FFE62A61-4168-26CC-93B3-683820DDEF9B}"/>
+                <a16:creationId xmlns="" xmlns:a16="http://schemas.microsoft.com/office/drawing/2014/main" id="{FFE62A61-4168-26CC-93B3-683820DDEF9B}"/>
               </a:ext>
             </a:extLst>
           </p:cNvPr>
@@ -1467,7 +1467,7 @@
           <p:cNvPr id="7" name="Slide Number Placeholder 6">
             <a:extLst>
               <a:ext uri="{FF2B5EF4-FFF2-40B4-BE49-F238E27FC236}">
-                <a16:creationId xmlns:a16="http://schemas.microsoft.com/office/drawing/2014/main" id="{4634E477-B40D-8D3E-6DC2-1AC9B036FDE7}"/>
+                <a16:creationId xmlns="" xmlns:a16="http://schemas.microsoft.com/office/drawing/2014/main" id="{4634E477-B40D-8D3E-6DC2-1AC9B036FDE7}"/>
               </a:ext>
             </a:extLst>
           </p:cNvPr>
@@ -1526,7 +1526,7 @@
           <p:cNvPr id="2" name="Title 1">
             <a:extLst>
               <a:ext uri="{FF2B5EF4-FFF2-40B4-BE49-F238E27FC236}">
-                <a16:creationId xmlns:a16="http://schemas.microsoft.com/office/drawing/2014/main" id="{44865982-7856-A120-897F-D70473069296}"/>
+                <a16:creationId xmlns="" xmlns:a16="http://schemas.microsoft.com/office/drawing/2014/main" id="{44865982-7856-A120-897F-D70473069296}"/>
               </a:ext>
             </a:extLst>
           </p:cNvPr>
@@ -1560,7 +1560,7 @@
           <p:cNvPr id="3" name="Text Placeholder 2">
             <a:extLst>
               <a:ext uri="{FF2B5EF4-FFF2-40B4-BE49-F238E27FC236}">
-                <a16:creationId xmlns:a16="http://schemas.microsoft.com/office/drawing/2014/main" id="{538D52EB-C6C9-14DB-C39F-05A13FAA7FA8}"/>
+                <a16:creationId xmlns="" xmlns:a16="http://schemas.microsoft.com/office/drawing/2014/main" id="{538D52EB-C6C9-14DB-C39F-05A13FAA7FA8}"/>
               </a:ext>
             </a:extLst>
           </p:cNvPr>
@@ -1631,7 +1631,7 @@
           <p:cNvPr id="4" name="Content Placeholder 3">
             <a:extLst>
               <a:ext uri="{FF2B5EF4-FFF2-40B4-BE49-F238E27FC236}">
-                <a16:creationId xmlns:a16="http://schemas.microsoft.com/office/drawing/2014/main" id="{2F9939C4-C3A8-5DC6-5A03-4E06E5BD6A5F}"/>
+                <a16:creationId xmlns="" xmlns:a16="http://schemas.microsoft.com/office/drawing/2014/main" id="{2F9939C4-C3A8-5DC6-5A03-4E06E5BD6A5F}"/>
               </a:ext>
             </a:extLst>
           </p:cNvPr>
@@ -1694,7 +1694,7 @@
           <p:cNvPr id="5" name="Text Placeholder 4">
             <a:extLst>
               <a:ext uri="{FF2B5EF4-FFF2-40B4-BE49-F238E27FC236}">
-                <a16:creationId xmlns:a16="http://schemas.microsoft.com/office/drawing/2014/main" id="{94451D85-6826-075A-E2DD-716FBE57BE32}"/>
+                <a16:creationId xmlns="" xmlns:a16="http://schemas.microsoft.com/office/drawing/2014/main" id="{94451D85-6826-075A-E2DD-716FBE57BE32}"/>
               </a:ext>
             </a:extLst>
           </p:cNvPr>
@@ -1765,7 +1765,7 @@
           <p:cNvPr id="6" name="Content Placeholder 5">
             <a:extLst>
               <a:ext uri="{FF2B5EF4-FFF2-40B4-BE49-F238E27FC236}">
-                <a16:creationId xmlns:a16="http://schemas.microsoft.com/office/drawing/2014/main" id="{DCA66085-DC5D-ED87-50D6-6609036B971C}"/>
+                <a16:creationId xmlns="" xmlns:a16="http://schemas.microsoft.com/office/drawing/2014/main" id="{DCA66085-DC5D-ED87-50D6-6609036B971C}"/>
               </a:ext>
             </a:extLst>
           </p:cNvPr>
@@ -1828,7 +1828,7 @@
           <p:cNvPr id="7" name="Date Placeholder 6">
             <a:extLst>
               <a:ext uri="{FF2B5EF4-FFF2-40B4-BE49-F238E27FC236}">
-                <a16:creationId xmlns:a16="http://schemas.microsoft.com/office/drawing/2014/main" id="{DB8002D5-A8B9-4663-693D-13244095A09D}"/>
+                <a16:creationId xmlns="" xmlns:a16="http://schemas.microsoft.com/office/drawing/2014/main" id="{DB8002D5-A8B9-4663-693D-13244095A09D}"/>
               </a:ext>
             </a:extLst>
           </p:cNvPr>
@@ -1846,7 +1846,7 @@
           <a:p>
             <a:fld id="{7B289A56-B7BF-4EE2-A684-7373F14AFF3B}" type="datetimeFigureOut">
               <a:rPr lang="en-IN" smtClean="0"/>
-              <a:t>07-10-2023</a:t>
+              <a:t>25-12-2025</a:t>
             </a:fld>
             <a:endParaRPr lang="en-IN"/>
           </a:p>
@@ -1857,7 +1857,7 @@
           <p:cNvPr id="8" name="Footer Placeholder 7">
             <a:extLst>
               <a:ext uri="{FF2B5EF4-FFF2-40B4-BE49-F238E27FC236}">
-                <a16:creationId xmlns:a16="http://schemas.microsoft.com/office/drawing/2014/main" id="{9A5C1A38-7DB7-27B3-EE2B-0FA8A1EA1472}"/>
+                <a16:creationId xmlns="" xmlns:a16="http://schemas.microsoft.com/office/drawing/2014/main" id="{9A5C1A38-7DB7-27B3-EE2B-0FA8A1EA1472}"/>
               </a:ext>
             </a:extLst>
           </p:cNvPr>
@@ -1882,7 +1882,7 @@
           <p:cNvPr id="9" name="Slide Number Placeholder 8">
             <a:extLst>
               <a:ext uri="{FF2B5EF4-FFF2-40B4-BE49-F238E27FC236}">
-                <a16:creationId xmlns:a16="http://schemas.microsoft.com/office/drawing/2014/main" id="{69C0E241-9EDE-42DD-B32D-8D7A25957E41}"/>
+                <a16:creationId xmlns="" xmlns:a16="http://schemas.microsoft.com/office/drawing/2014/main" id="{69C0E241-9EDE-42DD-B32D-8D7A25957E41}"/>
               </a:ext>
             </a:extLst>
           </p:cNvPr>
@@ -1941,7 +1941,7 @@
           <p:cNvPr id="2" name="Title 1">
             <a:extLst>
               <a:ext uri="{FF2B5EF4-FFF2-40B4-BE49-F238E27FC236}">
-                <a16:creationId xmlns:a16="http://schemas.microsoft.com/office/drawing/2014/main" id="{B2A3C722-C2C3-AD81-3B33-252378421D3E}"/>
+                <a16:creationId xmlns="" xmlns:a16="http://schemas.microsoft.com/office/drawing/2014/main" id="{B2A3C722-C2C3-AD81-3B33-252378421D3E}"/>
               </a:ext>
             </a:extLst>
           </p:cNvPr>
@@ -1970,7 +1970,7 @@
           <p:cNvPr id="3" name="Date Placeholder 2">
             <a:extLst>
               <a:ext uri="{FF2B5EF4-FFF2-40B4-BE49-F238E27FC236}">
-                <a16:creationId xmlns:a16="http://schemas.microsoft.com/office/drawing/2014/main" id="{CF7C2B20-69F1-93CB-4468-49A7AC79F6BE}"/>
+                <a16:creationId xmlns="" xmlns:a16="http://schemas.microsoft.com/office/drawing/2014/main" id="{CF7C2B20-69F1-93CB-4468-49A7AC79F6BE}"/>
               </a:ext>
             </a:extLst>
           </p:cNvPr>
@@ -1988,7 +1988,7 @@
           <a:p>
             <a:fld id="{7B289A56-B7BF-4EE2-A684-7373F14AFF3B}" type="datetimeFigureOut">
               <a:rPr lang="en-IN" smtClean="0"/>
-              <a:t>07-10-2023</a:t>
+              <a:t>25-12-2025</a:t>
             </a:fld>
             <a:endParaRPr lang="en-IN"/>
           </a:p>
@@ -1999,7 +1999,7 @@
           <p:cNvPr id="4" name="Footer Placeholder 3">
             <a:extLst>
               <a:ext uri="{FF2B5EF4-FFF2-40B4-BE49-F238E27FC236}">
-                <a16:creationId xmlns:a16="http://schemas.microsoft.com/office/drawing/2014/main" id="{E4F5AEDF-21FC-20A9-A97C-010FF7361913}"/>
+                <a16:creationId xmlns="" xmlns:a16="http://schemas.microsoft.com/office/drawing/2014/main" id="{E4F5AEDF-21FC-20A9-A97C-010FF7361913}"/>
               </a:ext>
             </a:extLst>
           </p:cNvPr>
@@ -2024,7 +2024,7 @@
           <p:cNvPr id="5" name="Slide Number Placeholder 4">
             <a:extLst>
               <a:ext uri="{FF2B5EF4-FFF2-40B4-BE49-F238E27FC236}">
-                <a16:creationId xmlns:a16="http://schemas.microsoft.com/office/drawing/2014/main" id="{54A905B7-E5B8-FCA6-C612-AD126D9F070F}"/>
+                <a16:creationId xmlns="" xmlns:a16="http://schemas.microsoft.com/office/drawing/2014/main" id="{54A905B7-E5B8-FCA6-C612-AD126D9F070F}"/>
               </a:ext>
             </a:extLst>
           </p:cNvPr>
@@ -2083,7 +2083,7 @@
           <p:cNvPr id="2" name="Date Placeholder 1">
             <a:extLst>
               <a:ext uri="{FF2B5EF4-FFF2-40B4-BE49-F238E27FC236}">
-                <a16:creationId xmlns:a16="http://schemas.microsoft.com/office/drawing/2014/main" id="{B75F24FB-A0D9-0867-6BDA-FAA10E8AFA24}"/>
+                <a16:creationId xmlns="" xmlns:a16="http://schemas.microsoft.com/office/drawing/2014/main" id="{B75F24FB-A0D9-0867-6BDA-FAA10E8AFA24}"/>
               </a:ext>
             </a:extLst>
           </p:cNvPr>
@@ -2101,7 +2101,7 @@
           <a:p>
             <a:fld id="{7B289A56-B7BF-4EE2-A684-7373F14AFF3B}" type="datetimeFigureOut">
               <a:rPr lang="en-IN" smtClean="0"/>
-              <a:t>07-10-2023</a:t>
+              <a:t>25-12-2025</a:t>
             </a:fld>
             <a:endParaRPr lang="en-IN"/>
           </a:p>
@@ -2112,7 +2112,7 @@
           <p:cNvPr id="3" name="Footer Placeholder 2">
             <a:extLst>
               <a:ext uri="{FF2B5EF4-FFF2-40B4-BE49-F238E27FC236}">
-                <a16:creationId xmlns:a16="http://schemas.microsoft.com/office/drawing/2014/main" id="{0528FC46-75DF-0D30-C8E5-88F2C536162A}"/>
+                <a16:creationId xmlns="" xmlns:a16="http://schemas.microsoft.com/office/drawing/2014/main" id="{0528FC46-75DF-0D30-C8E5-88F2C536162A}"/>
               </a:ext>
             </a:extLst>
           </p:cNvPr>
@@ -2137,7 +2137,7 @@
           <p:cNvPr id="4" name="Slide Number Placeholder 3">
             <a:extLst>
               <a:ext uri="{FF2B5EF4-FFF2-40B4-BE49-F238E27FC236}">
-                <a16:creationId xmlns:a16="http://schemas.microsoft.com/office/drawing/2014/main" id="{5FCC571C-B718-3EBF-2B95-85CEF876BE72}"/>
+                <a16:creationId xmlns="" xmlns:a16="http://schemas.microsoft.com/office/drawing/2014/main" id="{5FCC571C-B718-3EBF-2B95-85CEF876BE72}"/>
               </a:ext>
             </a:extLst>
           </p:cNvPr>
@@ -2196,7 +2196,7 @@
           <p:cNvPr id="2" name="Title 1">
             <a:extLst>
               <a:ext uri="{FF2B5EF4-FFF2-40B4-BE49-F238E27FC236}">
-                <a16:creationId xmlns:a16="http://schemas.microsoft.com/office/drawing/2014/main" id="{FF9056D2-DEB1-30AE-51E1-EE91F66CAD3F}"/>
+                <a16:creationId xmlns="" xmlns:a16="http://schemas.microsoft.com/office/drawing/2014/main" id="{FF9056D2-DEB1-30AE-51E1-EE91F66CAD3F}"/>
               </a:ext>
             </a:extLst>
           </p:cNvPr>
@@ -2234,7 +2234,7 @@
           <p:cNvPr id="3" name="Content Placeholder 2">
             <a:extLst>
               <a:ext uri="{FF2B5EF4-FFF2-40B4-BE49-F238E27FC236}">
-                <a16:creationId xmlns:a16="http://schemas.microsoft.com/office/drawing/2014/main" id="{425EAE68-FA8B-41E2-E3FB-36A46A154662}"/>
+                <a16:creationId xmlns="" xmlns:a16="http://schemas.microsoft.com/office/drawing/2014/main" id="{425EAE68-FA8B-41E2-E3FB-36A46A154662}"/>
               </a:ext>
             </a:extLst>
           </p:cNvPr>
@@ -2325,7 +2325,7 @@
           <p:cNvPr id="4" name="Text Placeholder 3">
             <a:extLst>
               <a:ext uri="{FF2B5EF4-FFF2-40B4-BE49-F238E27FC236}">
-                <a16:creationId xmlns:a16="http://schemas.microsoft.com/office/drawing/2014/main" id="{573C4BCD-7C3D-22E6-24BE-7467A7592257}"/>
+                <a16:creationId xmlns="" xmlns:a16="http://schemas.microsoft.com/office/drawing/2014/main" id="{573C4BCD-7C3D-22E6-24BE-7467A7592257}"/>
               </a:ext>
             </a:extLst>
           </p:cNvPr>
@@ -2396,7 +2396,7 @@
           <p:cNvPr id="5" name="Date Placeholder 4">
             <a:extLst>
               <a:ext uri="{FF2B5EF4-FFF2-40B4-BE49-F238E27FC236}">
-                <a16:creationId xmlns:a16="http://schemas.microsoft.com/office/drawing/2014/main" id="{0643662B-AE05-9268-0E56-CD679C6B26ED}"/>
+                <a16:creationId xmlns="" xmlns:a16="http://schemas.microsoft.com/office/drawing/2014/main" id="{0643662B-AE05-9268-0E56-CD679C6B26ED}"/>
               </a:ext>
             </a:extLst>
           </p:cNvPr>
@@ -2414,7 +2414,7 @@
           <a:p>
             <a:fld id="{7B289A56-B7BF-4EE2-A684-7373F14AFF3B}" type="datetimeFigureOut">
               <a:rPr lang="en-IN" smtClean="0"/>
-              <a:t>07-10-2023</a:t>
+              <a:t>25-12-2025</a:t>
             </a:fld>
             <a:endParaRPr lang="en-IN"/>
           </a:p>
@@ -2425,7 +2425,7 @@
           <p:cNvPr id="6" name="Footer Placeholder 5">
             <a:extLst>
               <a:ext uri="{FF2B5EF4-FFF2-40B4-BE49-F238E27FC236}">
-                <a16:creationId xmlns:a16="http://schemas.microsoft.com/office/drawing/2014/main" id="{A6C6A849-17CD-A798-9990-6220B27F19B8}"/>
+                <a16:creationId xmlns="" xmlns:a16="http://schemas.microsoft.com/office/drawing/2014/main" id="{A6C6A849-17CD-A798-9990-6220B27F19B8}"/>
               </a:ext>
             </a:extLst>
           </p:cNvPr>
@@ -2450,7 +2450,7 @@
           <p:cNvPr id="7" name="Slide Number Placeholder 6">
             <a:extLst>
               <a:ext uri="{FF2B5EF4-FFF2-40B4-BE49-F238E27FC236}">
-                <a16:creationId xmlns:a16="http://schemas.microsoft.com/office/drawing/2014/main" id="{F18D7318-CA5C-54BF-3E83-9C37673518A4}"/>
+                <a16:creationId xmlns="" xmlns:a16="http://schemas.microsoft.com/office/drawing/2014/main" id="{F18D7318-CA5C-54BF-3E83-9C37673518A4}"/>
               </a:ext>
             </a:extLst>
           </p:cNvPr>
@@ -2509,7 +2509,7 @@
           <p:cNvPr id="2" name="Title 1">
             <a:extLst>
               <a:ext uri="{FF2B5EF4-FFF2-40B4-BE49-F238E27FC236}">
-                <a16:creationId xmlns:a16="http://schemas.microsoft.com/office/drawing/2014/main" id="{F3EA8056-573E-5E0D-778E-4DE41CB98783}"/>
+                <a16:creationId xmlns="" xmlns:a16="http://schemas.microsoft.com/office/drawing/2014/main" id="{F3EA8056-573E-5E0D-778E-4DE41CB98783}"/>
               </a:ext>
             </a:extLst>
           </p:cNvPr>
@@ -2547,7 +2547,7 @@
           <p:cNvPr id="3" name="Picture Placeholder 2">
             <a:extLst>
               <a:ext uri="{FF2B5EF4-FFF2-40B4-BE49-F238E27FC236}">
-                <a16:creationId xmlns:a16="http://schemas.microsoft.com/office/drawing/2014/main" id="{49A09817-F19E-6A4F-5FF8-2F3D3AAF117F}"/>
+                <a16:creationId xmlns="" xmlns:a16="http://schemas.microsoft.com/office/drawing/2014/main" id="{49A09817-F19E-6A4F-5FF8-2F3D3AAF117F}"/>
               </a:ext>
             </a:extLst>
           </p:cNvPr>
@@ -2614,7 +2614,7 @@
           <p:cNvPr id="4" name="Text Placeholder 3">
             <a:extLst>
               <a:ext uri="{FF2B5EF4-FFF2-40B4-BE49-F238E27FC236}">
-                <a16:creationId xmlns:a16="http://schemas.microsoft.com/office/drawing/2014/main" id="{65E0419C-229C-2594-B804-6EA900883037}"/>
+                <a16:creationId xmlns="" xmlns:a16="http://schemas.microsoft.com/office/drawing/2014/main" id="{65E0419C-229C-2594-B804-6EA900883037}"/>
               </a:ext>
             </a:extLst>
           </p:cNvPr>
@@ -2685,7 +2685,7 @@
           <p:cNvPr id="5" name="Date Placeholder 4">
             <a:extLst>
               <a:ext uri="{FF2B5EF4-FFF2-40B4-BE49-F238E27FC236}">
-                <a16:creationId xmlns:a16="http://schemas.microsoft.com/office/drawing/2014/main" id="{1F38213C-4F0F-7E55-13F1-BAAD409512C6}"/>
+                <a16:creationId xmlns="" xmlns:a16="http://schemas.microsoft.com/office/drawing/2014/main" id="{1F38213C-4F0F-7E55-13F1-BAAD409512C6}"/>
               </a:ext>
             </a:extLst>
           </p:cNvPr>
@@ -2703,7 +2703,7 @@
           <a:p>
             <a:fld id="{7B289A56-B7BF-4EE2-A684-7373F14AFF3B}" type="datetimeFigureOut">
               <a:rPr lang="en-IN" smtClean="0"/>
-              <a:t>07-10-2023</a:t>
+              <a:t>25-12-2025</a:t>
             </a:fld>
             <a:endParaRPr lang="en-IN"/>
           </a:p>
@@ -2714,7 +2714,7 @@
           <p:cNvPr id="6" name="Footer Placeholder 5">
             <a:extLst>
               <a:ext uri="{FF2B5EF4-FFF2-40B4-BE49-F238E27FC236}">
-                <a16:creationId xmlns:a16="http://schemas.microsoft.com/office/drawing/2014/main" id="{F47548F3-EEE0-2CB0-0510-48D1CC2F1AAE}"/>
+                <a16:creationId xmlns="" xmlns:a16="http://schemas.microsoft.com/office/drawing/2014/main" id="{F47548F3-EEE0-2CB0-0510-48D1CC2F1AAE}"/>
               </a:ext>
             </a:extLst>
           </p:cNvPr>
@@ -2739,7 +2739,7 @@
           <p:cNvPr id="7" name="Slide Number Placeholder 6">
             <a:extLst>
               <a:ext uri="{FF2B5EF4-FFF2-40B4-BE49-F238E27FC236}">
-                <a16:creationId xmlns:a16="http://schemas.microsoft.com/office/drawing/2014/main" id="{62F2A5B8-D47F-A235-0038-FCFC9CC9015F}"/>
+                <a16:creationId xmlns="" xmlns:a16="http://schemas.microsoft.com/office/drawing/2014/main" id="{62F2A5B8-D47F-A235-0038-FCFC9CC9015F}"/>
               </a:ext>
             </a:extLst>
           </p:cNvPr>
@@ -2803,7 +2803,7 @@
           <p:cNvPr id="2" name="Title Placeholder 1">
             <a:extLst>
               <a:ext uri="{FF2B5EF4-FFF2-40B4-BE49-F238E27FC236}">
-                <a16:creationId xmlns:a16="http://schemas.microsoft.com/office/drawing/2014/main" id="{2B916DC5-6480-E0BC-F1F7-D7E605F29628}"/>
+                <a16:creationId xmlns="" xmlns:a16="http://schemas.microsoft.com/office/drawing/2014/main" id="{2B916DC5-6480-E0BC-F1F7-D7E605F29628}"/>
               </a:ext>
             </a:extLst>
           </p:cNvPr>
@@ -2842,7 +2842,7 @@
           <p:cNvPr id="3" name="Text Placeholder 2">
             <a:extLst>
               <a:ext uri="{FF2B5EF4-FFF2-40B4-BE49-F238E27FC236}">
-                <a16:creationId xmlns:a16="http://schemas.microsoft.com/office/drawing/2014/main" id="{5E45A303-F574-AA86-3F6C-B592CDEE8AE5}"/>
+                <a16:creationId xmlns="" xmlns:a16="http://schemas.microsoft.com/office/drawing/2014/main" id="{5E45A303-F574-AA86-3F6C-B592CDEE8AE5}"/>
               </a:ext>
             </a:extLst>
           </p:cNvPr>
@@ -2910,7 +2910,7 @@
           <p:cNvPr id="4" name="Date Placeholder 3">
             <a:extLst>
               <a:ext uri="{FF2B5EF4-FFF2-40B4-BE49-F238E27FC236}">
-                <a16:creationId xmlns:a16="http://schemas.microsoft.com/office/drawing/2014/main" id="{E5335D02-92E6-CE42-BFE8-8029C2A42A48}"/>
+                <a16:creationId xmlns="" xmlns:a16="http://schemas.microsoft.com/office/drawing/2014/main" id="{E5335D02-92E6-CE42-BFE8-8029C2A42A48}"/>
               </a:ext>
             </a:extLst>
           </p:cNvPr>
@@ -2946,7 +2946,7 @@
           <a:p>
             <a:fld id="{7B289A56-B7BF-4EE2-A684-7373F14AFF3B}" type="datetimeFigureOut">
               <a:rPr lang="en-IN" smtClean="0"/>
-              <a:t>07-10-2023</a:t>
+              <a:t>25-12-2025</a:t>
             </a:fld>
             <a:endParaRPr lang="en-IN"/>
           </a:p>
@@ -2957,7 +2957,7 @@
           <p:cNvPr id="5" name="Footer Placeholder 4">
             <a:extLst>
               <a:ext uri="{FF2B5EF4-FFF2-40B4-BE49-F238E27FC236}">
-                <a16:creationId xmlns:a16="http://schemas.microsoft.com/office/drawing/2014/main" id="{8B90A4AE-F6D4-1200-163D-1FE1D2E81FC8}"/>
+                <a16:creationId xmlns="" xmlns:a16="http://schemas.microsoft.com/office/drawing/2014/main" id="{8B90A4AE-F6D4-1200-163D-1FE1D2E81FC8}"/>
               </a:ext>
             </a:extLst>
           </p:cNvPr>
@@ -3000,7 +3000,7 @@
           <p:cNvPr id="6" name="Slide Number Placeholder 5">
             <a:extLst>
               <a:ext uri="{FF2B5EF4-FFF2-40B4-BE49-F238E27FC236}">
-                <a16:creationId xmlns:a16="http://schemas.microsoft.com/office/drawing/2014/main" id="{7EAA569D-EF3A-0E41-7F3B-0EDD07E67EED}"/>
+                <a16:creationId xmlns="" xmlns:a16="http://schemas.microsoft.com/office/drawing/2014/main" id="{7EAA569D-EF3A-0E41-7F3B-0EDD07E67EED}"/>
               </a:ext>
             </a:extLst>
           </p:cNvPr>
@@ -3378,7 +3378,7 @@
           <p:cNvPr id="13" name="TextBox 12">
             <a:extLst>
               <a:ext uri="{FF2B5EF4-FFF2-40B4-BE49-F238E27FC236}">
-                <a16:creationId xmlns:a16="http://schemas.microsoft.com/office/drawing/2014/main" id="{EFD37F5C-B498-7E9E-7268-B898BED7C5C1}"/>
+                <a16:creationId xmlns="" xmlns:a16="http://schemas.microsoft.com/office/drawing/2014/main" id="{EFD37F5C-B498-7E9E-7268-B898BED7C5C1}"/>
               </a:ext>
             </a:extLst>
           </p:cNvPr>
@@ -3403,7 +3403,7 @@
           <a:p>
             <a:pPr algn="ctr"/>
             <a:r>
-              <a:rPr lang="en-IN" sz="6000" dirty="0">
+              <a:rPr lang="en-IN" sz="6000" dirty="0" smtClean="0">
                 <a:solidFill>
                   <a:schemeClr val="accent5">
                     <a:lumMod val="20000"/>
@@ -3412,17 +3412,17 @@
                 </a:solidFill>
                 <a:latin typeface="Lato Black" panose="020F0A02020204030203" pitchFamily="34" charset="0"/>
               </a:rPr>
-              <a:t>MS SQL SERVER</a:t>
+              <a:t>MYSQL </a:t>
             </a:r>
           </a:p>
         </p:txBody>
       </p:sp>
       <p:pic>
         <p:nvPicPr>
-          <p:cNvPr id="15" name="Picture 12" descr="Sql server - Free logo icons">
-            <a:extLst>
-              <a:ext uri="{FF2B5EF4-FFF2-40B4-BE49-F238E27FC236}">
-                <a16:creationId xmlns:a16="http://schemas.microsoft.com/office/drawing/2014/main" id="{F41865F3-DE1B-AB07-633A-FDEB072AE684}"/>
+          <p:cNvPr id="16" name="Picture 14" descr="Logo Mysql PNG Images, Free Download - Free Transparent PNG Logos">
+            <a:extLst>
+              <a:ext uri="{FF2B5EF4-FFF2-40B4-BE49-F238E27FC236}">
+                <a16:creationId xmlns="" xmlns:a16="http://schemas.microsoft.com/office/drawing/2014/main" id="{CA1D7C9D-9E08-9075-9F65-42DE06B424DF}"/>
               </a:ext>
             </a:extLst>
           </p:cNvPr>
@@ -3432,14 +3432,7 @@
           <p:nvPr/>
         </p:nvPicPr>
         <p:blipFill>
-          <a:blip r:embed="rId2">
-            <a:duotone>
-              <a:schemeClr val="accent4">
-                <a:shade val="45000"/>
-                <a:satMod val="135000"/>
-              </a:schemeClr>
-              <a:prstClr val="white"/>
-            </a:duotone>
+          <a:blip r:embed="rId2" cstate="print">
             <a:extLst>
               <a:ext uri="{28A0092B-C50C-407E-A947-70E740481C1C}">
                 <a14:useLocalDpi xmlns:a14="http://schemas.microsoft.com/office/drawing/2010/main" val="0"/>
@@ -3453,8 +3446,8 @@
         </p:blipFill>
         <p:spPr bwMode="auto">
           <a:xfrm>
-            <a:off x="6535406" y="4765145"/>
-            <a:ext cx="1935214" cy="1935214"/>
+            <a:off x="5255874" y="4951406"/>
+            <a:ext cx="1679450" cy="1761832"/>
           </a:xfrm>
           <a:prstGeom prst="rect">
             <a:avLst/>
@@ -3471,59 +3464,52 @@
           </a:extLst>
         </p:spPr>
       </p:pic>
-      <p:pic>
-        <p:nvPicPr>
-          <p:cNvPr id="16" name="Picture 14" descr="Logo Mysql PNG Images, Free Download - Free Transparent PNG Logos">
-            <a:extLst>
-              <a:ext uri="{FF2B5EF4-FFF2-40B4-BE49-F238E27FC236}">
-                <a16:creationId xmlns:a16="http://schemas.microsoft.com/office/drawing/2014/main" id="{CA1D7C9D-9E08-9075-9F65-42DE06B424DF}"/>
-              </a:ext>
-            </a:extLst>
-          </p:cNvPr>
-          <p:cNvPicPr>
-            <a:picLocks noChangeAspect="1" noChangeArrowheads="1"/>
-          </p:cNvPicPr>
+      <p:sp>
+        <p:nvSpPr>
+          <p:cNvPr id="17" name="TextBox 16">
+            <a:extLst>
+              <a:ext uri="{FF2B5EF4-FFF2-40B4-BE49-F238E27FC236}">
+                <a16:creationId xmlns="" xmlns:a16="http://schemas.microsoft.com/office/drawing/2014/main" id="{23AE5A38-1C90-91C3-C264-017362FE588D}"/>
+              </a:ext>
+            </a:extLst>
+          </p:cNvPr>
+          <p:cNvSpPr txBox="1"/>
           <p:nvPr/>
-        </p:nvPicPr>
-        <p:blipFill>
-          <a:blip r:embed="rId3">
-            <a:extLst>
-              <a:ext uri="{28A0092B-C50C-407E-A947-70E740481C1C}">
-                <a14:useLocalDpi xmlns:a14="http://schemas.microsoft.com/office/drawing/2010/main" val="0"/>
-              </a:ext>
-            </a:extLst>
-          </a:blip>
-          <a:srcRect/>
-          <a:stretch>
-            <a:fillRect/>
-          </a:stretch>
-        </p:blipFill>
-        <p:spPr bwMode="auto">
-          <a:xfrm>
-            <a:off x="3598026" y="4938527"/>
-            <a:ext cx="1679450" cy="1761832"/>
+        </p:nvSpPr>
+        <p:spPr>
+          <a:xfrm>
+            <a:off x="4990697" y="2194695"/>
+            <a:ext cx="2209804" cy="830997"/>
           </a:xfrm>
           <a:prstGeom prst="rect">
             <a:avLst/>
           </a:prstGeom>
           <a:noFill/>
-          <a:extLst>
-            <a:ext uri="{909E8E84-426E-40DD-AFC4-6F175D3DCCD1}">
-              <a14:hiddenFill xmlns:a14="http://schemas.microsoft.com/office/drawing/2010/main">
-                <a:solidFill>
-                  <a:srgbClr val="FFFFFF"/>
-                </a:solidFill>
-              </a14:hiddenFill>
-            </a:ext>
-          </a:extLst>
-        </p:spPr>
-      </p:pic>
-      <p:sp>
-        <p:nvSpPr>
-          <p:cNvPr id="17" name="TextBox 16">
-            <a:extLst>
-              <a:ext uri="{FF2B5EF4-FFF2-40B4-BE49-F238E27FC236}">
-                <a16:creationId xmlns:a16="http://schemas.microsoft.com/office/drawing/2014/main" id="{23AE5A38-1C90-91C3-C264-017362FE588D}"/>
+        </p:spPr>
+        <p:txBody>
+          <a:bodyPr wrap="square" rtlCol="0">
+            <a:spAutoFit/>
+          </a:bodyPr>
+          <a:lstStyle/>
+          <a:p>
+            <a:r>
+              <a:rPr lang="en-IN" sz="4800" dirty="0">
+                <a:solidFill>
+                  <a:srgbClr val="92D050"/>
+                </a:solidFill>
+                <a:latin typeface="Lato Black" panose="020F0A02020204030203" pitchFamily="34" charset="0"/>
+              </a:rPr>
+              <a:t>PART 1</a:t>
+            </a:r>
+          </a:p>
+        </p:txBody>
+      </p:sp>
+      <p:sp>
+        <p:nvSpPr>
+          <p:cNvPr id="18" name="TextBox 17">
+            <a:extLst>
+              <a:ext uri="{FF2B5EF4-FFF2-40B4-BE49-F238E27FC236}">
+                <a16:creationId xmlns="" xmlns:a16="http://schemas.microsoft.com/office/drawing/2014/main" id="{01F6CB98-36C5-38E5-0DF0-29D3168418DC}"/>
               </a:ext>
             </a:extLst>
           </p:cNvPr>
@@ -3532,8 +3518,8 @@
         </p:nvSpPr>
         <p:spPr>
           <a:xfrm>
-            <a:off x="4990697" y="2194695"/>
-            <a:ext cx="2209804" cy="830997"/>
+            <a:off x="0" y="157641"/>
+            <a:ext cx="12192000" cy="646331"/>
           </a:xfrm>
           <a:prstGeom prst="rect">
             <a:avLst/>
@@ -3546,24 +3532,37 @@
           </a:bodyPr>
           <a:lstStyle/>
           <a:p>
-            <a:r>
-              <a:rPr lang="en-IN" sz="4800" dirty="0">
-                <a:solidFill>
-                  <a:srgbClr val="92D050"/>
+            <a:pPr algn="ctr"/>
+            <a:r>
+              <a:rPr lang="en-IN" sz="3600" dirty="0">
+                <a:solidFill>
+                  <a:schemeClr val="accent4">
+                    <a:lumMod val="60000"/>
+                    <a:lumOff val="40000"/>
+                  </a:schemeClr>
                 </a:solidFill>
                 <a:latin typeface="Lato Black" panose="020F0A02020204030203" pitchFamily="34" charset="0"/>
               </a:rPr>
-              <a:t>PART 1</a:t>
-            </a:r>
-          </a:p>
-        </p:txBody>
-      </p:sp>
-      <p:sp>
-        <p:nvSpPr>
-          <p:cNvPr id="18" name="TextBox 17">
-            <a:extLst>
-              <a:ext uri="{FF2B5EF4-FFF2-40B4-BE49-F238E27FC236}">
-                <a16:creationId xmlns:a16="http://schemas.microsoft.com/office/drawing/2014/main" id="{01F6CB98-36C5-38E5-0DF0-29D3168418DC}"/>
+              <a:t>DATA ANALYST </a:t>
+            </a:r>
+            <a:r>
+              <a:rPr lang="en-IN" sz="3600" dirty="0">
+                <a:solidFill>
+                  <a:schemeClr val="bg1"/>
+                </a:solidFill>
+                <a:latin typeface="Lato Black" panose="020F0A02020204030203" pitchFamily="34" charset="0"/>
+              </a:rPr>
+              <a:t>PORTFOLIO PROJECT</a:t>
+            </a:r>
+          </a:p>
+        </p:txBody>
+      </p:sp>
+      <p:sp>
+        <p:nvSpPr>
+          <p:cNvPr id="19" name="TextBox 18">
+            <a:extLst>
+              <a:ext uri="{FF2B5EF4-FFF2-40B4-BE49-F238E27FC236}">
+                <a16:creationId xmlns="" xmlns:a16="http://schemas.microsoft.com/office/drawing/2014/main" id="{E8907EC3-CB54-081F-6806-59FB3EDC3F65}"/>
               </a:ext>
             </a:extLst>
           </p:cNvPr>
@@ -3572,8 +3571,8 @@
         </p:nvSpPr>
         <p:spPr>
           <a:xfrm>
-            <a:off x="0" y="157641"/>
-            <a:ext cx="12192000" cy="646331"/>
+            <a:off x="475491" y="1102030"/>
+            <a:ext cx="11240219" cy="1015663"/>
           </a:xfrm>
           <a:prstGeom prst="rect">
             <a:avLst/>
@@ -3588,59 +3587,6 @@
           <a:p>
             <a:pPr algn="ctr"/>
             <a:r>
-              <a:rPr lang="en-IN" sz="3600" dirty="0">
-                <a:solidFill>
-                  <a:schemeClr val="accent4">
-                    <a:lumMod val="60000"/>
-                    <a:lumOff val="40000"/>
-                  </a:schemeClr>
-                </a:solidFill>
-                <a:latin typeface="Lato Black" panose="020F0A02020204030203" pitchFamily="34" charset="0"/>
-              </a:rPr>
-              <a:t>DATA ANALYST </a:t>
-            </a:r>
-            <a:r>
-              <a:rPr lang="en-IN" sz="3600" dirty="0">
-                <a:solidFill>
-                  <a:schemeClr val="bg1"/>
-                </a:solidFill>
-                <a:latin typeface="Lato Black" panose="020F0A02020204030203" pitchFamily="34" charset="0"/>
-              </a:rPr>
-              <a:t>PORTFOLIO PROJECT</a:t>
-            </a:r>
-          </a:p>
-        </p:txBody>
-      </p:sp>
-      <p:sp>
-        <p:nvSpPr>
-          <p:cNvPr id="19" name="TextBox 18">
-            <a:extLst>
-              <a:ext uri="{FF2B5EF4-FFF2-40B4-BE49-F238E27FC236}">
-                <a16:creationId xmlns:a16="http://schemas.microsoft.com/office/drawing/2014/main" id="{E8907EC3-CB54-081F-6806-59FB3EDC3F65}"/>
-              </a:ext>
-            </a:extLst>
-          </p:cNvPr>
-          <p:cNvSpPr txBox="1"/>
-          <p:nvPr/>
-        </p:nvSpPr>
-        <p:spPr>
-          <a:xfrm>
-            <a:off x="475491" y="1102030"/>
-            <a:ext cx="11240219" cy="1015663"/>
-          </a:xfrm>
-          <a:prstGeom prst="rect">
-            <a:avLst/>
-          </a:prstGeom>
-          <a:noFill/>
-        </p:spPr>
-        <p:txBody>
-          <a:bodyPr wrap="square" rtlCol="0">
-            <a:spAutoFit/>
-          </a:bodyPr>
-          <a:lstStyle/>
-          <a:p>
-            <a:pPr algn="ctr"/>
-            <a:r>
               <a:rPr lang="en-IN" sz="6000" dirty="0">
                 <a:solidFill>
                   <a:srgbClr val="FFFF00"/>
@@ -3657,7 +3603,7 @@
           <p:cNvPr id="20" name="Picture 19">
             <a:extLst>
               <a:ext uri="{FF2B5EF4-FFF2-40B4-BE49-F238E27FC236}">
-                <a16:creationId xmlns:a16="http://schemas.microsoft.com/office/drawing/2014/main" id="{FE325C91-5367-908E-9FBA-338517C802F7}"/>
+                <a16:creationId xmlns="" xmlns:a16="http://schemas.microsoft.com/office/drawing/2014/main" id="{FE325C91-5367-908E-9FBA-338517C802F7}"/>
               </a:ext>
             </a:extLst>
           </p:cNvPr>
@@ -3667,7 +3613,7 @@
           <p:nvPr/>
         </p:nvPicPr>
         <p:blipFill>
-          <a:blip r:embed="rId4">
+          <a:blip r:embed="rId3" cstate="print">
             <a:duotone>
               <a:prstClr val="black"/>
               <a:schemeClr val="accent4">
@@ -3706,7 +3652,7 @@
     <a:masterClrMapping/>
   </p:clrMapOvr>
   <mc:AlternateContent xmlns:mc="http://schemas.openxmlformats.org/markup-compatibility/2006">
-    <mc:Choice xmlns:p159="http://schemas.microsoft.com/office/powerpoint/2015/09/main" Requires="p159">
+    <mc:Choice xmlns="" xmlns:p159="http://schemas.microsoft.com/office/powerpoint/2015/09/main" Requires="p159">
       <p:transition xmlns:p14="http://schemas.microsoft.com/office/powerpoint/2010/main" spd="slow" p14:dur="2000">
         <p159:morph option="byObject"/>
       </p:transition>
@@ -3752,7 +3698,7 @@
           <p:cNvPr id="5" name="TextBox 4">
             <a:extLst>
               <a:ext uri="{FF2B5EF4-FFF2-40B4-BE49-F238E27FC236}">
-                <a16:creationId xmlns:a16="http://schemas.microsoft.com/office/drawing/2014/main" id="{CB8C99B5-5307-E4E4-0E72-DE3504B0A583}"/>
+                <a16:creationId xmlns="" xmlns:a16="http://schemas.microsoft.com/office/drawing/2014/main" id="{CB8C99B5-5307-E4E4-0E72-DE3504B0A583}"/>
               </a:ext>
             </a:extLst>
           </p:cNvPr>
@@ -3794,7 +3740,7 @@
           <p:cNvPr id="6" name="Picture 5">
             <a:extLst>
               <a:ext uri="{FF2B5EF4-FFF2-40B4-BE49-F238E27FC236}">
-                <a16:creationId xmlns:a16="http://schemas.microsoft.com/office/drawing/2014/main" id="{EE843937-0252-6408-B4D5-06B6D9531E56}"/>
+                <a16:creationId xmlns="" xmlns:a16="http://schemas.microsoft.com/office/drawing/2014/main" id="{EE843937-0252-6408-B4D5-06B6D9531E56}"/>
               </a:ext>
             </a:extLst>
           </p:cNvPr>
@@ -3804,7 +3750,7 @@
           <p:nvPr/>
         </p:nvPicPr>
         <p:blipFill>
-          <a:blip r:embed="rId2">
+          <a:blip r:embed="rId2" cstate="print">
             <a:extLst>
               <a:ext uri="{28A0092B-C50C-407E-A947-70E740481C1C}">
                 <a14:useLocalDpi xmlns:a14="http://schemas.microsoft.com/office/drawing/2010/main" val="0"/>
@@ -3831,7 +3777,7 @@
           <p:cNvPr id="4" name="Picture 3">
             <a:extLst>
               <a:ext uri="{FF2B5EF4-FFF2-40B4-BE49-F238E27FC236}">
-                <a16:creationId xmlns:a16="http://schemas.microsoft.com/office/drawing/2014/main" id="{A90D7939-6504-7430-B6E9-29AEB10BAE2E}"/>
+                <a16:creationId xmlns="" xmlns:a16="http://schemas.microsoft.com/office/drawing/2014/main" id="{A90D7939-6504-7430-B6E9-29AEB10BAE2E}"/>
               </a:ext>
             </a:extLst>
           </p:cNvPr>
@@ -3861,7 +3807,7 @@
           <p:cNvPr id="7" name="Picture 6">
             <a:extLst>
               <a:ext uri="{FF2B5EF4-FFF2-40B4-BE49-F238E27FC236}">
-                <a16:creationId xmlns:a16="http://schemas.microsoft.com/office/drawing/2014/main" id="{03BC04EE-8041-7D9D-CA19-298D68483000}"/>
+                <a16:creationId xmlns="" xmlns:a16="http://schemas.microsoft.com/office/drawing/2014/main" id="{03BC04EE-8041-7D9D-CA19-298D68483000}"/>
               </a:ext>
             </a:extLst>
           </p:cNvPr>
@@ -3871,7 +3817,7 @@
           <p:nvPr/>
         </p:nvPicPr>
         <p:blipFill>
-          <a:blip r:embed="rId4">
+          <a:blip r:embed="rId4" cstate="print">
             <a:duotone>
               <a:prstClr val="black"/>
               <a:schemeClr val="accent4">
@@ -3947,7 +3893,7 @@
           <p:cNvPr id="2" name="TextBox 1">
             <a:extLst>
               <a:ext uri="{FF2B5EF4-FFF2-40B4-BE49-F238E27FC236}">
-                <a16:creationId xmlns:a16="http://schemas.microsoft.com/office/drawing/2014/main" id="{F2186767-6DBF-43ED-0334-E389A8026F75}"/>
+                <a16:creationId xmlns="" xmlns:a16="http://schemas.microsoft.com/office/drawing/2014/main" id="{F2186767-6DBF-43ED-0334-E389A8026F75}"/>
               </a:ext>
             </a:extLst>
           </p:cNvPr>
@@ -3956,7 +3902,7 @@
         </p:nvSpPr>
         <p:spPr>
           <a:xfrm>
-            <a:off x="127778" y="57150"/>
+            <a:off x="127778" y="18514"/>
             <a:ext cx="9397221" cy="584775"/>
           </a:xfrm>
           <a:prstGeom prst="rect">
@@ -3999,7 +3945,7 @@
           <p:cNvPr id="7" name="Picture 6">
             <a:extLst>
               <a:ext uri="{FF2B5EF4-FFF2-40B4-BE49-F238E27FC236}">
-                <a16:creationId xmlns:a16="http://schemas.microsoft.com/office/drawing/2014/main" id="{4F56E1CB-C23A-8E6C-4322-BE518ECDDE56}"/>
+                <a16:creationId xmlns="" xmlns:a16="http://schemas.microsoft.com/office/drawing/2014/main" id="{4F56E1CB-C23A-8E6C-4322-BE518ECDDE56}"/>
               </a:ext>
             </a:extLst>
           </p:cNvPr>
@@ -4009,7 +3955,7 @@
           <p:nvPr/>
         </p:nvPicPr>
         <p:blipFill>
-          <a:blip r:embed="rId2">
+          <a:blip r:embed="rId2" cstate="print">
             <a:duotone>
               <a:prstClr val="black"/>
               <a:schemeClr val="accent4">
@@ -4042,7 +3988,7 @@
           <p:cNvPr id="3" name="TextBox 2">
             <a:extLst>
               <a:ext uri="{FF2B5EF4-FFF2-40B4-BE49-F238E27FC236}">
-                <a16:creationId xmlns:a16="http://schemas.microsoft.com/office/drawing/2014/main" id="{1058CA99-5896-CF6F-E3D9-47410F2EEA1D}"/>
+                <a16:creationId xmlns="" xmlns:a16="http://schemas.microsoft.com/office/drawing/2014/main" id="{1058CA99-5896-CF6F-E3D9-47410F2EEA1D}"/>
               </a:ext>
             </a:extLst>
           </p:cNvPr>
@@ -4106,7 +4052,7 @@
           <p:cNvPr id="4" name="TextBox 3">
             <a:extLst>
               <a:ext uri="{FF2B5EF4-FFF2-40B4-BE49-F238E27FC236}">
-                <a16:creationId xmlns:a16="http://schemas.microsoft.com/office/drawing/2014/main" id="{0E3EF215-20BB-527A-E72D-12F6F9355EC2}"/>
+                <a16:creationId xmlns="" xmlns:a16="http://schemas.microsoft.com/office/drawing/2014/main" id="{0E3EF215-20BB-527A-E72D-12F6F9355EC2}"/>
               </a:ext>
             </a:extLst>
           </p:cNvPr>
@@ -4398,7 +4344,7 @@
           <p:cNvPr id="2" name="TextBox 1">
             <a:extLst>
               <a:ext uri="{FF2B5EF4-FFF2-40B4-BE49-F238E27FC236}">
-                <a16:creationId xmlns:a16="http://schemas.microsoft.com/office/drawing/2014/main" id="{F2186767-6DBF-43ED-0334-E389A8026F75}"/>
+                <a16:creationId xmlns="" xmlns:a16="http://schemas.microsoft.com/office/drawing/2014/main" id="{F2186767-6DBF-43ED-0334-E389A8026F75}"/>
               </a:ext>
             </a:extLst>
           </p:cNvPr>
@@ -4450,7 +4396,7 @@
           <p:cNvPr id="7" name="Picture 6">
             <a:extLst>
               <a:ext uri="{FF2B5EF4-FFF2-40B4-BE49-F238E27FC236}">
-                <a16:creationId xmlns:a16="http://schemas.microsoft.com/office/drawing/2014/main" id="{4F56E1CB-C23A-8E6C-4322-BE518ECDDE56}"/>
+                <a16:creationId xmlns="" xmlns:a16="http://schemas.microsoft.com/office/drawing/2014/main" id="{4F56E1CB-C23A-8E6C-4322-BE518ECDDE56}"/>
               </a:ext>
             </a:extLst>
           </p:cNvPr>
@@ -4460,7 +4406,7 @@
           <p:nvPr/>
         </p:nvPicPr>
         <p:blipFill>
-          <a:blip r:embed="rId2">
+          <a:blip r:embed="rId2" cstate="print">
             <a:duotone>
               <a:prstClr val="black"/>
               <a:schemeClr val="accent4">
@@ -4493,7 +4439,7 @@
           <p:cNvPr id="3" name="TextBox 2">
             <a:extLst>
               <a:ext uri="{FF2B5EF4-FFF2-40B4-BE49-F238E27FC236}">
-                <a16:creationId xmlns:a16="http://schemas.microsoft.com/office/drawing/2014/main" id="{1058CA99-5896-CF6F-E3D9-47410F2EEA1D}"/>
+                <a16:creationId xmlns="" xmlns:a16="http://schemas.microsoft.com/office/drawing/2014/main" id="{1058CA99-5896-CF6F-E3D9-47410F2EEA1D}"/>
               </a:ext>
             </a:extLst>
           </p:cNvPr>
@@ -4557,7 +4503,7 @@
           <p:cNvPr id="4" name="TextBox 3">
             <a:extLst>
               <a:ext uri="{FF2B5EF4-FFF2-40B4-BE49-F238E27FC236}">
-                <a16:creationId xmlns:a16="http://schemas.microsoft.com/office/drawing/2014/main" id="{0E3EF215-20BB-527A-E72D-12F6F9355EC2}"/>
+                <a16:creationId xmlns="" xmlns:a16="http://schemas.microsoft.com/office/drawing/2014/main" id="{0E3EF215-20BB-527A-E72D-12F6F9355EC2}"/>
               </a:ext>
             </a:extLst>
           </p:cNvPr>
@@ -4744,7 +4690,7 @@
           <p:cNvPr id="5" name="TextBox 4">
             <a:extLst>
               <a:ext uri="{FF2B5EF4-FFF2-40B4-BE49-F238E27FC236}">
-                <a16:creationId xmlns:a16="http://schemas.microsoft.com/office/drawing/2014/main" id="{1BC36B1B-46BC-47F8-6C86-7B04F62B2F7F}"/>
+                <a16:creationId xmlns="" xmlns:a16="http://schemas.microsoft.com/office/drawing/2014/main" id="{1BC36B1B-46BC-47F8-6C86-7B04F62B2F7F}"/>
               </a:ext>
             </a:extLst>
           </p:cNvPr>
@@ -4902,7 +4848,7 @@
           <p:cNvPr id="6" name="TextBox 5">
             <a:extLst>
               <a:ext uri="{FF2B5EF4-FFF2-40B4-BE49-F238E27FC236}">
-                <a16:creationId xmlns:a16="http://schemas.microsoft.com/office/drawing/2014/main" id="{E5340642-52BE-80AC-4C5E-F8F223F9BB8F}"/>
+                <a16:creationId xmlns="" xmlns:a16="http://schemas.microsoft.com/office/drawing/2014/main" id="{E5340642-52BE-80AC-4C5E-F8F223F9BB8F}"/>
               </a:ext>
             </a:extLst>
           </p:cNvPr>
@@ -5022,7 +4968,7 @@
           <p:cNvPr id="2" name="TextBox 1">
             <a:extLst>
               <a:ext uri="{FF2B5EF4-FFF2-40B4-BE49-F238E27FC236}">
-                <a16:creationId xmlns:a16="http://schemas.microsoft.com/office/drawing/2014/main" id="{F2186767-6DBF-43ED-0334-E389A8026F75}"/>
+                <a16:creationId xmlns="" xmlns:a16="http://schemas.microsoft.com/office/drawing/2014/main" id="{F2186767-6DBF-43ED-0334-E389A8026F75}"/>
               </a:ext>
             </a:extLst>
           </p:cNvPr>
@@ -5074,7 +5020,7 @@
           <p:cNvPr id="7" name="Picture 6">
             <a:extLst>
               <a:ext uri="{FF2B5EF4-FFF2-40B4-BE49-F238E27FC236}">
-                <a16:creationId xmlns:a16="http://schemas.microsoft.com/office/drawing/2014/main" id="{4F56E1CB-C23A-8E6C-4322-BE518ECDDE56}"/>
+                <a16:creationId xmlns="" xmlns:a16="http://schemas.microsoft.com/office/drawing/2014/main" id="{4F56E1CB-C23A-8E6C-4322-BE518ECDDE56}"/>
               </a:ext>
             </a:extLst>
           </p:cNvPr>
@@ -5084,7 +5030,7 @@
           <p:nvPr/>
         </p:nvPicPr>
         <p:blipFill>
-          <a:blip r:embed="rId2">
+          <a:blip r:embed="rId2" cstate="print">
             <a:duotone>
               <a:prstClr val="black"/>
               <a:schemeClr val="accent4">
@@ -5117,7 +5063,7 @@
           <p:cNvPr id="3" name="TextBox 2">
             <a:extLst>
               <a:ext uri="{FF2B5EF4-FFF2-40B4-BE49-F238E27FC236}">
-                <a16:creationId xmlns:a16="http://schemas.microsoft.com/office/drawing/2014/main" id="{1058CA99-5896-CF6F-E3D9-47410F2EEA1D}"/>
+                <a16:creationId xmlns="" xmlns:a16="http://schemas.microsoft.com/office/drawing/2014/main" id="{1058CA99-5896-CF6F-E3D9-47410F2EEA1D}"/>
               </a:ext>
             </a:extLst>
           </p:cNvPr>
@@ -5181,7 +5127,7 @@
           <p:cNvPr id="4" name="TextBox 3">
             <a:extLst>
               <a:ext uri="{FF2B5EF4-FFF2-40B4-BE49-F238E27FC236}">
-                <a16:creationId xmlns:a16="http://schemas.microsoft.com/office/drawing/2014/main" id="{0E3EF215-20BB-527A-E72D-12F6F9355EC2}"/>
+                <a16:creationId xmlns="" xmlns:a16="http://schemas.microsoft.com/office/drawing/2014/main" id="{0E3EF215-20BB-527A-E72D-12F6F9355EC2}"/>
               </a:ext>
             </a:extLst>
           </p:cNvPr>
@@ -5553,7 +5499,7 @@
           <p:cNvPr id="2" name="TextBox 1">
             <a:extLst>
               <a:ext uri="{FF2B5EF4-FFF2-40B4-BE49-F238E27FC236}">
-                <a16:creationId xmlns:a16="http://schemas.microsoft.com/office/drawing/2014/main" id="{F2186767-6DBF-43ED-0334-E389A8026F75}"/>
+                <a16:creationId xmlns="" xmlns:a16="http://schemas.microsoft.com/office/drawing/2014/main" id="{F2186767-6DBF-43ED-0334-E389A8026F75}"/>
               </a:ext>
             </a:extLst>
           </p:cNvPr>
@@ -5605,7 +5551,7 @@
           <p:cNvPr id="7" name="Picture 6">
             <a:extLst>
               <a:ext uri="{FF2B5EF4-FFF2-40B4-BE49-F238E27FC236}">
-                <a16:creationId xmlns:a16="http://schemas.microsoft.com/office/drawing/2014/main" id="{4F56E1CB-C23A-8E6C-4322-BE518ECDDE56}"/>
+                <a16:creationId xmlns="" xmlns:a16="http://schemas.microsoft.com/office/drawing/2014/main" id="{4F56E1CB-C23A-8E6C-4322-BE518ECDDE56}"/>
               </a:ext>
             </a:extLst>
           </p:cNvPr>
@@ -5615,7 +5561,7 @@
           <p:nvPr/>
         </p:nvPicPr>
         <p:blipFill>
-          <a:blip r:embed="rId2">
+          <a:blip r:embed="rId2" cstate="print">
             <a:duotone>
               <a:prstClr val="black"/>
               <a:schemeClr val="accent4">
@@ -5648,7 +5594,7 @@
           <p:cNvPr id="3" name="TextBox 2">
             <a:extLst>
               <a:ext uri="{FF2B5EF4-FFF2-40B4-BE49-F238E27FC236}">
-                <a16:creationId xmlns:a16="http://schemas.microsoft.com/office/drawing/2014/main" id="{1058CA99-5896-CF6F-E3D9-47410F2EEA1D}"/>
+                <a16:creationId xmlns="" xmlns:a16="http://schemas.microsoft.com/office/drawing/2014/main" id="{1058CA99-5896-CF6F-E3D9-47410F2EEA1D}"/>
               </a:ext>
             </a:extLst>
           </p:cNvPr>
@@ -5712,7 +5658,7 @@
           <p:cNvPr id="4" name="TextBox 3">
             <a:extLst>
               <a:ext uri="{FF2B5EF4-FFF2-40B4-BE49-F238E27FC236}">
-                <a16:creationId xmlns:a16="http://schemas.microsoft.com/office/drawing/2014/main" id="{0E3EF215-20BB-527A-E72D-12F6F9355EC2}"/>
+                <a16:creationId xmlns="" xmlns:a16="http://schemas.microsoft.com/office/drawing/2014/main" id="{0E3EF215-20BB-527A-E72D-12F6F9355EC2}"/>
               </a:ext>
             </a:extLst>
           </p:cNvPr>
@@ -5911,7 +5857,7 @@
           <p:cNvPr id="2" name="TextBox 1">
             <a:extLst>
               <a:ext uri="{FF2B5EF4-FFF2-40B4-BE49-F238E27FC236}">
-                <a16:creationId xmlns:a16="http://schemas.microsoft.com/office/drawing/2014/main" id="{F2186767-6DBF-43ED-0334-E389A8026F75}"/>
+                <a16:creationId xmlns="" xmlns:a16="http://schemas.microsoft.com/office/drawing/2014/main" id="{F2186767-6DBF-43ED-0334-E389A8026F75}"/>
               </a:ext>
             </a:extLst>
           </p:cNvPr>
@@ -5958,7 +5904,7 @@
           <p:cNvPr id="7" name="Picture 6">
             <a:extLst>
               <a:ext uri="{FF2B5EF4-FFF2-40B4-BE49-F238E27FC236}">
-                <a16:creationId xmlns:a16="http://schemas.microsoft.com/office/drawing/2014/main" id="{4F56E1CB-C23A-8E6C-4322-BE518ECDDE56}"/>
+                <a16:creationId xmlns="" xmlns:a16="http://schemas.microsoft.com/office/drawing/2014/main" id="{4F56E1CB-C23A-8E6C-4322-BE518ECDDE56}"/>
               </a:ext>
             </a:extLst>
           </p:cNvPr>
@@ -5968,7 +5914,7 @@
           <p:nvPr/>
         </p:nvPicPr>
         <p:blipFill>
-          <a:blip r:embed="rId2">
+          <a:blip r:embed="rId2" cstate="print">
             <a:duotone>
               <a:prstClr val="black"/>
               <a:schemeClr val="accent4">
@@ -6001,7 +5947,7 @@
           <p:cNvPr id="8" name="TextBox 7">
             <a:extLst>
               <a:ext uri="{FF2B5EF4-FFF2-40B4-BE49-F238E27FC236}">
-                <a16:creationId xmlns:a16="http://schemas.microsoft.com/office/drawing/2014/main" id="{F0646760-0DB5-6324-7B30-1D918A65A865}"/>
+                <a16:creationId xmlns="" xmlns:a16="http://schemas.microsoft.com/office/drawing/2014/main" id="{F0646760-0DB5-6324-7B30-1D918A65A865}"/>
               </a:ext>
             </a:extLst>
           </p:cNvPr>
@@ -6353,7 +6299,7 @@
           <p:cNvPr id="9" name="TextBox 8">
             <a:extLst>
               <a:ext uri="{FF2B5EF4-FFF2-40B4-BE49-F238E27FC236}">
-                <a16:creationId xmlns:a16="http://schemas.microsoft.com/office/drawing/2014/main" id="{64CDC267-C4AE-056C-B4A2-9F57B5EF2822}"/>
+                <a16:creationId xmlns="" xmlns:a16="http://schemas.microsoft.com/office/drawing/2014/main" id="{64CDC267-C4AE-056C-B4A2-9F57B5EF2822}"/>
               </a:ext>
             </a:extLst>
           </p:cNvPr>
@@ -6396,7 +6342,7 @@
           <p:cNvPr id="10" name="TextBox 9">
             <a:extLst>
               <a:ext uri="{FF2B5EF4-FFF2-40B4-BE49-F238E27FC236}">
-                <a16:creationId xmlns:a16="http://schemas.microsoft.com/office/drawing/2014/main" id="{8E141D8C-EC5D-22DE-B591-0E506E4E2BA6}"/>
+                <a16:creationId xmlns="" xmlns:a16="http://schemas.microsoft.com/office/drawing/2014/main" id="{8E141D8C-EC5D-22DE-B591-0E506E4E2BA6}"/>
               </a:ext>
             </a:extLst>
           </p:cNvPr>
@@ -6767,7 +6713,7 @@
           <p:cNvPr id="11" name="TextBox 10">
             <a:extLst>
               <a:ext uri="{FF2B5EF4-FFF2-40B4-BE49-F238E27FC236}">
-                <a16:creationId xmlns:a16="http://schemas.microsoft.com/office/drawing/2014/main" id="{38D39873-19FF-7E34-62AE-83E4D322A2EE}"/>
+                <a16:creationId xmlns="" xmlns:a16="http://schemas.microsoft.com/office/drawing/2014/main" id="{38D39873-19FF-7E34-62AE-83E4D322A2EE}"/>
               </a:ext>
             </a:extLst>
           </p:cNvPr>
@@ -6850,7 +6796,7 @@
           <p:cNvPr id="2" name="TextBox 1">
             <a:extLst>
               <a:ext uri="{FF2B5EF4-FFF2-40B4-BE49-F238E27FC236}">
-                <a16:creationId xmlns:a16="http://schemas.microsoft.com/office/drawing/2014/main" id="{F2186767-6DBF-43ED-0334-E389A8026F75}"/>
+                <a16:creationId xmlns="" xmlns:a16="http://schemas.microsoft.com/office/drawing/2014/main" id="{F2186767-6DBF-43ED-0334-E389A8026F75}"/>
               </a:ext>
             </a:extLst>
           </p:cNvPr>
@@ -6902,7 +6848,7 @@
           <p:cNvPr id="7" name="Picture 6">
             <a:extLst>
               <a:ext uri="{FF2B5EF4-FFF2-40B4-BE49-F238E27FC236}">
-                <a16:creationId xmlns:a16="http://schemas.microsoft.com/office/drawing/2014/main" id="{4F56E1CB-C23A-8E6C-4322-BE518ECDDE56}"/>
+                <a16:creationId xmlns="" xmlns:a16="http://schemas.microsoft.com/office/drawing/2014/main" id="{4F56E1CB-C23A-8E6C-4322-BE518ECDDE56}"/>
               </a:ext>
             </a:extLst>
           </p:cNvPr>
@@ -6912,7 +6858,7 @@
           <p:nvPr/>
         </p:nvPicPr>
         <p:blipFill>
-          <a:blip r:embed="rId2">
+          <a:blip r:embed="rId2" cstate="print">
             <a:duotone>
               <a:prstClr val="black"/>
               <a:schemeClr val="accent4">
@@ -6945,7 +6891,7 @@
           <p:cNvPr id="5" name="TextBox 4">
             <a:extLst>
               <a:ext uri="{FF2B5EF4-FFF2-40B4-BE49-F238E27FC236}">
-                <a16:creationId xmlns:a16="http://schemas.microsoft.com/office/drawing/2014/main" id="{1D777C5A-2770-C97F-8953-E1F5A24DD560}"/>
+                <a16:creationId xmlns="" xmlns:a16="http://schemas.microsoft.com/office/drawing/2014/main" id="{1D777C5A-2770-C97F-8953-E1F5A24DD560}"/>
               </a:ext>
             </a:extLst>
           </p:cNvPr>
@@ -7119,7 +7065,7 @@
           <p:cNvPr id="7" name="Picture 6">
             <a:extLst>
               <a:ext uri="{FF2B5EF4-FFF2-40B4-BE49-F238E27FC236}">
-                <a16:creationId xmlns:a16="http://schemas.microsoft.com/office/drawing/2014/main" id="{4F56E1CB-C23A-8E6C-4322-BE518ECDDE56}"/>
+                <a16:creationId xmlns="" xmlns:a16="http://schemas.microsoft.com/office/drawing/2014/main" id="{4F56E1CB-C23A-8E6C-4322-BE518ECDDE56}"/>
               </a:ext>
             </a:extLst>
           </p:cNvPr>
@@ -7129,7 +7075,7 @@
           <p:nvPr/>
         </p:nvPicPr>
         <p:blipFill>
-          <a:blip r:embed="rId2">
+          <a:blip r:embed="rId2" cstate="print">
             <a:duotone>
               <a:prstClr val="black"/>
               <a:schemeClr val="accent4">
@@ -7162,7 +7108,7 @@
           <p:cNvPr id="5" name="Picture 4">
             <a:extLst>
               <a:ext uri="{FF2B5EF4-FFF2-40B4-BE49-F238E27FC236}">
-                <a16:creationId xmlns:a16="http://schemas.microsoft.com/office/drawing/2014/main" id="{0AF6B3D0-09AE-4F17-9CB2-07E656EB3637}"/>
+                <a16:creationId xmlns="" xmlns:a16="http://schemas.microsoft.com/office/drawing/2014/main" id="{0AF6B3D0-09AE-4F17-9CB2-07E656EB3637}"/>
               </a:ext>
             </a:extLst>
           </p:cNvPr>
@@ -7192,7 +7138,7 @@
           <p:cNvPr id="6" name="Picture 6" descr="Like Comment Share PNGs for Free Download">
             <a:extLst>
               <a:ext uri="{FF2B5EF4-FFF2-40B4-BE49-F238E27FC236}">
-                <a16:creationId xmlns:a16="http://schemas.microsoft.com/office/drawing/2014/main" id="{82211E88-89CC-1B62-06B7-D0439322858C}"/>
+                <a16:creationId xmlns="" xmlns:a16="http://schemas.microsoft.com/office/drawing/2014/main" id="{82211E88-89CC-1B62-06B7-D0439322858C}"/>
               </a:ext>
             </a:extLst>
           </p:cNvPr>
@@ -7202,7 +7148,7 @@
           <p:nvPr/>
         </p:nvPicPr>
         <p:blipFill>
-          <a:blip r:embed="rId4">
+          <a:blip r:embed="rId4" cstate="print">
             <a:extLst>
               <a:ext uri="{28A0092B-C50C-407E-A947-70E740481C1C}">
                 <a14:useLocalDpi xmlns:a14="http://schemas.microsoft.com/office/drawing/2010/main" val="0"/>
@@ -7282,7 +7228,7 @@
           <p:cNvPr id="20" name="Picture 19">
             <a:extLst>
               <a:ext uri="{FF2B5EF4-FFF2-40B4-BE49-F238E27FC236}">
-                <a16:creationId xmlns:a16="http://schemas.microsoft.com/office/drawing/2014/main" id="{FE325C91-5367-908E-9FBA-338517C802F7}"/>
+                <a16:creationId xmlns="" xmlns:a16="http://schemas.microsoft.com/office/drawing/2014/main" id="{FE325C91-5367-908E-9FBA-338517C802F7}"/>
               </a:ext>
             </a:extLst>
           </p:cNvPr>
@@ -7292,7 +7238,7 @@
           <p:nvPr/>
         </p:nvPicPr>
         <p:blipFill>
-          <a:blip r:embed="rId2">
+          <a:blip r:embed="rId2" cstate="print">
             <a:duotone>
               <a:prstClr val="black"/>
               <a:schemeClr val="accent4">
@@ -7325,7 +7271,7 @@
           <p:cNvPr id="3" name="TextBox 2">
             <a:extLst>
               <a:ext uri="{FF2B5EF4-FFF2-40B4-BE49-F238E27FC236}">
-                <a16:creationId xmlns:a16="http://schemas.microsoft.com/office/drawing/2014/main" id="{C3F29DCE-4F9B-3E06-25A9-49C99130379C}"/>
+                <a16:creationId xmlns="" xmlns:a16="http://schemas.microsoft.com/office/drawing/2014/main" id="{C3F29DCE-4F9B-3E06-25A9-49C99130379C}"/>
               </a:ext>
             </a:extLst>
           </p:cNvPr>
@@ -7369,7 +7315,7 @@
           <p:cNvPr id="4" name="TextBox 3">
             <a:extLst>
               <a:ext uri="{FF2B5EF4-FFF2-40B4-BE49-F238E27FC236}">
-                <a16:creationId xmlns:a16="http://schemas.microsoft.com/office/drawing/2014/main" id="{4FEE5224-59D0-0CB4-D868-7B2A980DA320}"/>
+                <a16:creationId xmlns="" xmlns:a16="http://schemas.microsoft.com/office/drawing/2014/main" id="{4FEE5224-59D0-0CB4-D868-7B2A980DA320}"/>
               </a:ext>
             </a:extLst>
           </p:cNvPr>
@@ -7414,7 +7360,7 @@
           <p:cNvPr id="5" name="TextBox 4">
             <a:extLst>
               <a:ext uri="{FF2B5EF4-FFF2-40B4-BE49-F238E27FC236}">
-                <a16:creationId xmlns:a16="http://schemas.microsoft.com/office/drawing/2014/main" id="{33BF6A62-6D9A-3528-4276-57102C0BF48F}"/>
+                <a16:creationId xmlns="" xmlns:a16="http://schemas.microsoft.com/office/drawing/2014/main" id="{33BF6A62-6D9A-3528-4276-57102C0BF48F}"/>
               </a:ext>
             </a:extLst>
           </p:cNvPr>
@@ -7423,7 +7369,7 @@
         </p:nvSpPr>
         <p:spPr>
           <a:xfrm>
-            <a:off x="2603736" y="119959"/>
+            <a:off x="2148787" y="134233"/>
             <a:ext cx="5047891" cy="830997"/>
           </a:xfrm>
           <a:prstGeom prst="rect">
@@ -7438,7 +7384,7 @@
           <a:lstStyle/>
           <a:p>
             <a:r>
-              <a:rPr lang="en-IN" sz="4800" dirty="0">
+              <a:rPr lang="en-IN" sz="4800" dirty="0" smtClean="0">
                 <a:solidFill>
                   <a:schemeClr val="accent5">
                     <a:lumMod val="20000"/>
@@ -7447,17 +7393,26 @@
                 </a:solidFill>
                 <a:latin typeface="Lato Black" panose="020F0A02020204030203" pitchFamily="34" charset="0"/>
               </a:rPr>
-              <a:t>MS SQL SERVER</a:t>
-            </a:r>
+              <a:t>MYSQL </a:t>
+            </a:r>
+            <a:endParaRPr lang="en-IN" sz="4800" dirty="0">
+              <a:solidFill>
+                <a:schemeClr val="accent5">
+                  <a:lumMod val="20000"/>
+                  <a:lumOff val="80000"/>
+                </a:schemeClr>
+              </a:solidFill>
+              <a:latin typeface="Lato Black" panose="020F0A02020204030203" pitchFamily="34" charset="0"/>
+            </a:endParaRPr>
           </a:p>
         </p:txBody>
       </p:sp>
       <p:pic>
         <p:nvPicPr>
-          <p:cNvPr id="6" name="Picture 12" descr="Sql server - Free logo icons">
-            <a:extLst>
-              <a:ext uri="{FF2B5EF4-FFF2-40B4-BE49-F238E27FC236}">
-                <a16:creationId xmlns:a16="http://schemas.microsoft.com/office/drawing/2014/main" id="{419E3FF8-C6F1-BC7D-0F6C-3907E21F090C}"/>
+          <p:cNvPr id="7" name="Picture 14" descr="Logo Mysql PNG Images, Free Download - Free Transparent PNG Logos">
+            <a:extLst>
+              <a:ext uri="{FF2B5EF4-FFF2-40B4-BE49-F238E27FC236}">
+                <a16:creationId xmlns="" xmlns:a16="http://schemas.microsoft.com/office/drawing/2014/main" id="{CB2ECD20-9715-9840-D011-C5E6334BEB4A}"/>
               </a:ext>
             </a:extLst>
           </p:cNvPr>
@@ -7467,14 +7422,7 @@
           <p:nvPr/>
         </p:nvPicPr>
         <p:blipFill>
-          <a:blip r:embed="rId3">
-            <a:duotone>
-              <a:schemeClr val="accent4">
-                <a:shade val="45000"/>
-                <a:satMod val="135000"/>
-              </a:schemeClr>
-              <a:prstClr val="white"/>
-            </a:duotone>
+          <a:blip r:embed="rId3" cstate="print">
             <a:extLst>
               <a:ext uri="{28A0092B-C50C-407E-A947-70E740481C1C}">
                 <a14:useLocalDpi xmlns:a14="http://schemas.microsoft.com/office/drawing/2010/main" val="0"/>
@@ -7488,8 +7436,8 @@
         </p:blipFill>
         <p:spPr bwMode="auto">
           <a:xfrm>
-            <a:off x="1548079" y="171703"/>
-            <a:ext cx="779253" cy="779253"/>
+            <a:off x="1351516" y="304283"/>
+            <a:ext cx="620658" cy="651103"/>
           </a:xfrm>
           <a:prstGeom prst="rect">
             <a:avLst/>
@@ -7508,10 +7456,40 @@
       </p:pic>
       <p:pic>
         <p:nvPicPr>
-          <p:cNvPr id="7" name="Picture 14" descr="Logo Mysql PNG Images, Free Download - Free Transparent PNG Logos">
-            <a:extLst>
-              <a:ext uri="{FF2B5EF4-FFF2-40B4-BE49-F238E27FC236}">
-                <a16:creationId xmlns:a16="http://schemas.microsoft.com/office/drawing/2014/main" id="{CB2ECD20-9715-9840-D011-C5E6334BEB4A}"/>
+          <p:cNvPr id="8" name="Picture 7">
+            <a:extLst>
+              <a:ext uri="{FF2B5EF4-FFF2-40B4-BE49-F238E27FC236}">
+                <a16:creationId xmlns="" xmlns:a16="http://schemas.microsoft.com/office/drawing/2014/main" id="{72646651-4D07-638D-94AF-12C3ADD27676}"/>
+              </a:ext>
+            </a:extLst>
+          </p:cNvPr>
+          <p:cNvPicPr>
+            <a:picLocks noChangeAspect="1"/>
+          </p:cNvPicPr>
+          <p:nvPr/>
+        </p:nvPicPr>
+        <p:blipFill>
+          <a:blip r:embed="rId4"/>
+          <a:stretch>
+            <a:fillRect/>
+          </a:stretch>
+        </p:blipFill>
+        <p:spPr>
+          <a:xfrm>
+            <a:off x="4965940" y="1323014"/>
+            <a:ext cx="6222520" cy="5366087"/>
+          </a:xfrm>
+          <a:prstGeom prst="rect">
+            <a:avLst/>
+          </a:prstGeom>
+        </p:spPr>
+      </p:pic>
+      <p:pic>
+        <p:nvPicPr>
+          <p:cNvPr id="9" name="Picture 18" descr="Data Import / Export through files — CMDBuild">
+            <a:extLst>
+              <a:ext uri="{FF2B5EF4-FFF2-40B4-BE49-F238E27FC236}">
+                <a16:creationId xmlns="" xmlns:a16="http://schemas.microsoft.com/office/drawing/2014/main" id="{9851E5A0-2C71-1CF7-360D-B0C080A4961C}"/>
               </a:ext>
             </a:extLst>
           </p:cNvPr>
@@ -7521,7 +7499,14 @@
           <p:nvPr/>
         </p:nvPicPr>
         <p:blipFill>
-          <a:blip r:embed="rId4">
+          <a:blip r:embed="rId5">
+            <a:duotone>
+              <a:schemeClr val="accent1">
+                <a:shade val="45000"/>
+                <a:satMod val="135000"/>
+              </a:schemeClr>
+              <a:prstClr val="white"/>
+            </a:duotone>
             <a:extLst>
               <a:ext uri="{28A0092B-C50C-407E-A947-70E740481C1C}">
                 <a14:useLocalDpi xmlns:a14="http://schemas.microsoft.com/office/drawing/2010/main" val="0"/>
@@ -7535,91 +7520,7 @@
         </p:blipFill>
         <p:spPr bwMode="auto">
           <a:xfrm>
-            <a:off x="651018" y="251038"/>
-            <a:ext cx="620658" cy="651103"/>
-          </a:xfrm>
-          <a:prstGeom prst="rect">
-            <a:avLst/>
-          </a:prstGeom>
-          <a:noFill/>
-          <a:extLst>
-            <a:ext uri="{909E8E84-426E-40DD-AFC4-6F175D3DCCD1}">
-              <a14:hiddenFill xmlns:a14="http://schemas.microsoft.com/office/drawing/2010/main">
-                <a:solidFill>
-                  <a:srgbClr val="FFFFFF"/>
-                </a:solidFill>
-              </a14:hiddenFill>
-            </a:ext>
-          </a:extLst>
-        </p:spPr>
-      </p:pic>
-      <p:pic>
-        <p:nvPicPr>
-          <p:cNvPr id="8" name="Picture 7">
-            <a:extLst>
-              <a:ext uri="{FF2B5EF4-FFF2-40B4-BE49-F238E27FC236}">
-                <a16:creationId xmlns:a16="http://schemas.microsoft.com/office/drawing/2014/main" id="{72646651-4D07-638D-94AF-12C3ADD27676}"/>
-              </a:ext>
-            </a:extLst>
-          </p:cNvPr>
-          <p:cNvPicPr>
-            <a:picLocks noChangeAspect="1"/>
-          </p:cNvPicPr>
-          <p:nvPr/>
-        </p:nvPicPr>
-        <p:blipFill>
-          <a:blip r:embed="rId5"/>
-          <a:stretch>
-            <a:fillRect/>
-          </a:stretch>
-        </p:blipFill>
-        <p:spPr>
-          <a:xfrm>
-            <a:off x="4965940" y="1310135"/>
-            <a:ext cx="6222520" cy="5366087"/>
-          </a:xfrm>
-          <a:prstGeom prst="rect">
-            <a:avLst/>
-          </a:prstGeom>
-        </p:spPr>
-      </p:pic>
-      <p:pic>
-        <p:nvPicPr>
-          <p:cNvPr id="9" name="Picture 18" descr="Data Import / Export through files — CMDBuild">
-            <a:extLst>
-              <a:ext uri="{FF2B5EF4-FFF2-40B4-BE49-F238E27FC236}">
-                <a16:creationId xmlns:a16="http://schemas.microsoft.com/office/drawing/2014/main" id="{9851E5A0-2C71-1CF7-360D-B0C080A4961C}"/>
-              </a:ext>
-            </a:extLst>
-          </p:cNvPr>
-          <p:cNvPicPr>
-            <a:picLocks noChangeAspect="1" noChangeArrowheads="1"/>
-          </p:cNvPicPr>
-          <p:nvPr/>
-        </p:nvPicPr>
-        <p:blipFill>
-          <a:blip r:embed="rId6">
-            <a:duotone>
-              <a:schemeClr val="accent1">
-                <a:shade val="45000"/>
-                <a:satMod val="135000"/>
-              </a:schemeClr>
-              <a:prstClr val="white"/>
-            </a:duotone>
-            <a:extLst>
-              <a:ext uri="{28A0092B-C50C-407E-A947-70E740481C1C}">
-                <a14:useLocalDpi xmlns:a14="http://schemas.microsoft.com/office/drawing/2010/main" val="0"/>
-              </a:ext>
-            </a:extLst>
-          </a:blip>
-          <a:srcRect/>
-          <a:stretch>
-            <a:fillRect/>
-          </a:stretch>
-        </p:blipFill>
-        <p:spPr bwMode="auto">
-          <a:xfrm>
-            <a:off x="123463" y="2108610"/>
+            <a:off x="123463" y="2147246"/>
             <a:ext cx="4050649" cy="4050649"/>
           </a:xfrm>
           <a:prstGeom prst="rect">
@@ -7648,7 +7549,7 @@
     <a:masterClrMapping/>
   </p:clrMapOvr>
   <mc:AlternateContent xmlns:mc="http://schemas.openxmlformats.org/markup-compatibility/2006">
-    <mc:Choice xmlns:p159="http://schemas.microsoft.com/office/powerpoint/2015/09/main" Requires="p159">
+    <mc:Choice xmlns="" xmlns:p159="http://schemas.microsoft.com/office/powerpoint/2015/09/main" Requires="p159">
       <p:transition xmlns:p14="http://schemas.microsoft.com/office/powerpoint/2010/main" spd="slow" p14:dur="2000">
         <p159:morph option="byObject"/>
       </p:transition>
@@ -7694,7 +7595,7 @@
           <p:cNvPr id="20" name="Picture 19">
             <a:extLst>
               <a:ext uri="{FF2B5EF4-FFF2-40B4-BE49-F238E27FC236}">
-                <a16:creationId xmlns:a16="http://schemas.microsoft.com/office/drawing/2014/main" id="{FE325C91-5367-908E-9FBA-338517C802F7}"/>
+                <a16:creationId xmlns="" xmlns:a16="http://schemas.microsoft.com/office/drawing/2014/main" id="{FE325C91-5367-908E-9FBA-338517C802F7}"/>
               </a:ext>
             </a:extLst>
           </p:cNvPr>
@@ -7704,7 +7605,7 @@
           <p:nvPr/>
         </p:nvPicPr>
         <p:blipFill>
-          <a:blip r:embed="rId2">
+          <a:blip r:embed="rId2" cstate="print">
             <a:duotone>
               <a:prstClr val="black"/>
               <a:schemeClr val="accent4">
@@ -7737,7 +7638,7 @@
           <p:cNvPr id="11" name="TextBox 10">
             <a:extLst>
               <a:ext uri="{FF2B5EF4-FFF2-40B4-BE49-F238E27FC236}">
-                <a16:creationId xmlns:a16="http://schemas.microsoft.com/office/drawing/2014/main" id="{6A577A3C-8BDB-56BA-633E-16205B278E35}"/>
+                <a16:creationId xmlns="" xmlns:a16="http://schemas.microsoft.com/office/drawing/2014/main" id="{6A577A3C-8BDB-56BA-633E-16205B278E35}"/>
               </a:ext>
             </a:extLst>
           </p:cNvPr>
@@ -7781,7 +7682,7 @@
           <p:cNvPr id="12" name="TextBox 11">
             <a:extLst>
               <a:ext uri="{FF2B5EF4-FFF2-40B4-BE49-F238E27FC236}">
-                <a16:creationId xmlns:a16="http://schemas.microsoft.com/office/drawing/2014/main" id="{5A05D65C-FEF3-B4EA-EBB1-061EF5E4281C}"/>
+                <a16:creationId xmlns="" xmlns:a16="http://schemas.microsoft.com/office/drawing/2014/main" id="{5A05D65C-FEF3-B4EA-EBB1-061EF5E4281C}"/>
               </a:ext>
             </a:extLst>
           </p:cNvPr>
@@ -7826,7 +7727,7 @@
           <p:cNvPr id="13" name="TextBox 12">
             <a:extLst>
               <a:ext uri="{FF2B5EF4-FFF2-40B4-BE49-F238E27FC236}">
-                <a16:creationId xmlns:a16="http://schemas.microsoft.com/office/drawing/2014/main" id="{9D2C5993-1A7E-2257-A719-633485B11CEA}"/>
+                <a16:creationId xmlns="" xmlns:a16="http://schemas.microsoft.com/office/drawing/2014/main" id="{9D2C5993-1A7E-2257-A719-633485B11CEA}"/>
               </a:ext>
             </a:extLst>
           </p:cNvPr>
@@ -7835,7 +7736,7 @@
         </p:nvSpPr>
         <p:spPr>
           <a:xfrm>
-            <a:off x="2603736" y="119959"/>
+            <a:off x="1991608" y="214336"/>
             <a:ext cx="5047891" cy="830997"/>
           </a:xfrm>
           <a:prstGeom prst="rect">
@@ -7859,17 +7760,26 @@
                 </a:solidFill>
                 <a:latin typeface="Lato Black" panose="020F0A02020204030203" pitchFamily="34" charset="0"/>
               </a:rPr>
-              <a:t>MS SQL SERVER</a:t>
-            </a:r>
+              <a:t>MYSQL </a:t>
+            </a:r>
+            <a:endParaRPr lang="en-IN" sz="4800" dirty="0">
+              <a:solidFill>
+                <a:schemeClr val="accent5">
+                  <a:lumMod val="20000"/>
+                  <a:lumOff val="80000"/>
+                </a:schemeClr>
+              </a:solidFill>
+              <a:latin typeface="Lato Black" panose="020F0A02020204030203" pitchFamily="34" charset="0"/>
+            </a:endParaRPr>
           </a:p>
         </p:txBody>
       </p:sp>
       <p:pic>
         <p:nvPicPr>
-          <p:cNvPr id="14" name="Picture 12" descr="Sql server - Free logo icons">
-            <a:extLst>
-              <a:ext uri="{FF2B5EF4-FFF2-40B4-BE49-F238E27FC236}">
-                <a16:creationId xmlns:a16="http://schemas.microsoft.com/office/drawing/2014/main" id="{A1C7A778-2966-2051-25A1-AA6A09DF3AF6}"/>
+          <p:cNvPr id="15" name="Picture 14" descr="Logo Mysql PNG Images, Free Download - Free Transparent PNG Logos">
+            <a:extLst>
+              <a:ext uri="{FF2B5EF4-FFF2-40B4-BE49-F238E27FC236}">
+                <a16:creationId xmlns="" xmlns:a16="http://schemas.microsoft.com/office/drawing/2014/main" id="{20D987B5-B900-B9DD-C73E-1C07E5E44ED9}"/>
               </a:ext>
             </a:extLst>
           </p:cNvPr>
@@ -7879,14 +7789,7 @@
           <p:nvPr/>
         </p:nvPicPr>
         <p:blipFill>
-          <a:blip r:embed="rId3">
-            <a:duotone>
-              <a:schemeClr val="accent4">
-                <a:shade val="45000"/>
-                <a:satMod val="135000"/>
-              </a:schemeClr>
-              <a:prstClr val="white"/>
-            </a:duotone>
+          <a:blip r:embed="rId3" cstate="print">
             <a:extLst>
               <a:ext uri="{28A0092B-C50C-407E-A947-70E740481C1C}">
                 <a14:useLocalDpi xmlns:a14="http://schemas.microsoft.com/office/drawing/2010/main" val="0"/>
@@ -7900,8 +7803,8 @@
         </p:blipFill>
         <p:spPr bwMode="auto">
           <a:xfrm>
-            <a:off x="1548079" y="171703"/>
-            <a:ext cx="779253" cy="779253"/>
+            <a:off x="1101779" y="283096"/>
+            <a:ext cx="620658" cy="651103"/>
           </a:xfrm>
           <a:prstGeom prst="rect">
             <a:avLst/>
@@ -7920,10 +7823,40 @@
       </p:pic>
       <p:pic>
         <p:nvPicPr>
-          <p:cNvPr id="15" name="Picture 14" descr="Logo Mysql PNG Images, Free Download - Free Transparent PNG Logos">
-            <a:extLst>
-              <a:ext uri="{FF2B5EF4-FFF2-40B4-BE49-F238E27FC236}">
-                <a16:creationId xmlns:a16="http://schemas.microsoft.com/office/drawing/2014/main" id="{20D987B5-B900-B9DD-C73E-1C07E5E44ED9}"/>
+          <p:cNvPr id="16" name="Picture 15">
+            <a:extLst>
+              <a:ext uri="{FF2B5EF4-FFF2-40B4-BE49-F238E27FC236}">
+                <a16:creationId xmlns="" xmlns:a16="http://schemas.microsoft.com/office/drawing/2014/main" id="{B01ADDCE-0998-425D-9A58-EE016290BB31}"/>
+              </a:ext>
+            </a:extLst>
+          </p:cNvPr>
+          <p:cNvPicPr>
+            <a:picLocks noChangeAspect="1"/>
+          </p:cNvPicPr>
+          <p:nvPr/>
+        </p:nvPicPr>
+        <p:blipFill>
+          <a:blip r:embed="rId4"/>
+          <a:stretch>
+            <a:fillRect/>
+          </a:stretch>
+        </p:blipFill>
+        <p:spPr>
+          <a:xfrm>
+            <a:off x="4965940" y="1310135"/>
+            <a:ext cx="6222520" cy="5366087"/>
+          </a:xfrm>
+          <a:prstGeom prst="rect">
+            <a:avLst/>
+          </a:prstGeom>
+        </p:spPr>
+      </p:pic>
+      <p:pic>
+        <p:nvPicPr>
+          <p:cNvPr id="17" name="Picture 2" descr="Add, create, database, hd, new, plus, server icon - Download on Iconfinder">
+            <a:extLst>
+              <a:ext uri="{FF2B5EF4-FFF2-40B4-BE49-F238E27FC236}">
+                <a16:creationId xmlns="" xmlns:a16="http://schemas.microsoft.com/office/drawing/2014/main" id="{088B7569-922A-9A8F-8B55-FBDCEF0A77A1}"/>
               </a:ext>
             </a:extLst>
           </p:cNvPr>
@@ -7933,84 +7866,7 @@
           <p:nvPr/>
         </p:nvPicPr>
         <p:blipFill>
-          <a:blip r:embed="rId4">
-            <a:extLst>
-              <a:ext uri="{28A0092B-C50C-407E-A947-70E740481C1C}">
-                <a14:useLocalDpi xmlns:a14="http://schemas.microsoft.com/office/drawing/2010/main" val="0"/>
-              </a:ext>
-            </a:extLst>
-          </a:blip>
-          <a:srcRect/>
-          <a:stretch>
-            <a:fillRect/>
-          </a:stretch>
-        </p:blipFill>
-        <p:spPr bwMode="auto">
-          <a:xfrm>
-            <a:off x="651018" y="251038"/>
-            <a:ext cx="620658" cy="651103"/>
-          </a:xfrm>
-          <a:prstGeom prst="rect">
-            <a:avLst/>
-          </a:prstGeom>
-          <a:noFill/>
-          <a:extLst>
-            <a:ext uri="{909E8E84-426E-40DD-AFC4-6F175D3DCCD1}">
-              <a14:hiddenFill xmlns:a14="http://schemas.microsoft.com/office/drawing/2010/main">
-                <a:solidFill>
-                  <a:srgbClr val="FFFFFF"/>
-                </a:solidFill>
-              </a14:hiddenFill>
-            </a:ext>
-          </a:extLst>
-        </p:spPr>
-      </p:pic>
-      <p:pic>
-        <p:nvPicPr>
-          <p:cNvPr id="16" name="Picture 15">
-            <a:extLst>
-              <a:ext uri="{FF2B5EF4-FFF2-40B4-BE49-F238E27FC236}">
-                <a16:creationId xmlns:a16="http://schemas.microsoft.com/office/drawing/2014/main" id="{B01ADDCE-0998-425D-9A58-EE016290BB31}"/>
-              </a:ext>
-            </a:extLst>
-          </p:cNvPr>
-          <p:cNvPicPr>
-            <a:picLocks noChangeAspect="1"/>
-          </p:cNvPicPr>
-          <p:nvPr/>
-        </p:nvPicPr>
-        <p:blipFill>
-          <a:blip r:embed="rId5"/>
-          <a:stretch>
-            <a:fillRect/>
-          </a:stretch>
-        </p:blipFill>
-        <p:spPr>
-          <a:xfrm>
-            <a:off x="4965940" y="1310135"/>
-            <a:ext cx="6222520" cy="5366087"/>
-          </a:xfrm>
-          <a:prstGeom prst="rect">
-            <a:avLst/>
-          </a:prstGeom>
-        </p:spPr>
-      </p:pic>
-      <p:pic>
-        <p:nvPicPr>
-          <p:cNvPr id="17" name="Picture 2" descr="Add, create, database, hd, new, plus, server icon - Download on Iconfinder">
-            <a:extLst>
-              <a:ext uri="{FF2B5EF4-FFF2-40B4-BE49-F238E27FC236}">
-                <a16:creationId xmlns:a16="http://schemas.microsoft.com/office/drawing/2014/main" id="{088B7569-922A-9A8F-8B55-FBDCEF0A77A1}"/>
-              </a:ext>
-            </a:extLst>
-          </p:cNvPr>
-          <p:cNvPicPr>
-            <a:picLocks noChangeAspect="1" noChangeArrowheads="1"/>
-          </p:cNvPicPr>
-          <p:nvPr/>
-        </p:nvPicPr>
-        <p:blipFill>
-          <a:blip r:embed="rId6">
+          <a:blip r:embed="rId5">
             <a:extLst>
               <a:ext uri="{28A0092B-C50C-407E-A947-70E740481C1C}">
                 <a14:useLocalDpi xmlns:a14="http://schemas.microsoft.com/office/drawing/2010/main" val="0"/>
@@ -8052,13 +7908,13 @@
   <p:clrMapOvr>
     <a:masterClrMapping/>
   </p:clrMapOvr>
-  <mc:AlternateContent xmlns:mc="http://schemas.openxmlformats.org/markup-compatibility/2006">
-    <mc:Choice xmlns:p14="http://schemas.microsoft.com/office/powerpoint/2010/main" Requires="p14">
+  <mc:AlternateContent xmlns:mc="http://schemas.openxmlformats.org/markup-compatibility/2006" xmlns:p14="http://schemas.microsoft.com/office/powerpoint/2010/main">
+    <mc:Choice Requires="p14">
       <p:transition p14:dur="100">
         <p:cut/>
       </p:transition>
     </mc:Choice>
-    <mc:Fallback>
+    <mc:Fallback xmlns="">
       <p:transition>
         <p:cut/>
       </p:transition>
@@ -8099,7 +7955,7 @@
           <p:cNvPr id="20" name="Picture 19">
             <a:extLst>
               <a:ext uri="{FF2B5EF4-FFF2-40B4-BE49-F238E27FC236}">
-                <a16:creationId xmlns:a16="http://schemas.microsoft.com/office/drawing/2014/main" id="{FE325C91-5367-908E-9FBA-338517C802F7}"/>
+                <a16:creationId xmlns="" xmlns:a16="http://schemas.microsoft.com/office/drawing/2014/main" id="{FE325C91-5367-908E-9FBA-338517C802F7}"/>
               </a:ext>
             </a:extLst>
           </p:cNvPr>
@@ -8109,7 +7965,7 @@
           <p:nvPr/>
         </p:nvPicPr>
         <p:blipFill>
-          <a:blip r:embed="rId2">
+          <a:blip r:embed="rId2" cstate="print">
             <a:duotone>
               <a:prstClr val="black"/>
               <a:schemeClr val="accent4">
@@ -8142,7 +7998,7 @@
           <p:cNvPr id="2" name="TextBox 1">
             <a:extLst>
               <a:ext uri="{FF2B5EF4-FFF2-40B4-BE49-F238E27FC236}">
-                <a16:creationId xmlns:a16="http://schemas.microsoft.com/office/drawing/2014/main" id="{CA2A3D0D-DDF0-B75E-2E66-13E023613410}"/>
+                <a16:creationId xmlns="" xmlns:a16="http://schemas.microsoft.com/office/drawing/2014/main" id="{CA2A3D0D-DDF0-B75E-2E66-13E023613410}"/>
               </a:ext>
             </a:extLst>
           </p:cNvPr>
@@ -8186,7 +8042,7 @@
           <p:cNvPr id="3" name="TextBox 2">
             <a:extLst>
               <a:ext uri="{FF2B5EF4-FFF2-40B4-BE49-F238E27FC236}">
-                <a16:creationId xmlns:a16="http://schemas.microsoft.com/office/drawing/2014/main" id="{4CDF014E-E113-E267-1E2F-E2465BD5AC91}"/>
+                <a16:creationId xmlns="" xmlns:a16="http://schemas.microsoft.com/office/drawing/2014/main" id="{4CDF014E-E113-E267-1E2F-E2465BD5AC91}"/>
               </a:ext>
             </a:extLst>
           </p:cNvPr>
@@ -8231,7 +8087,7 @@
           <p:cNvPr id="4" name="TextBox 3">
             <a:extLst>
               <a:ext uri="{FF2B5EF4-FFF2-40B4-BE49-F238E27FC236}">
-                <a16:creationId xmlns:a16="http://schemas.microsoft.com/office/drawing/2014/main" id="{2526BBC7-AD07-89BE-CDAF-EF8C8ED20231}"/>
+                <a16:creationId xmlns="" xmlns:a16="http://schemas.microsoft.com/office/drawing/2014/main" id="{2526BBC7-AD07-89BE-CDAF-EF8C8ED20231}"/>
               </a:ext>
             </a:extLst>
           </p:cNvPr>
@@ -8240,7 +8096,7 @@
         </p:nvSpPr>
         <p:spPr>
           <a:xfrm>
-            <a:off x="2603736" y="119959"/>
+            <a:off x="1740851" y="93867"/>
             <a:ext cx="5047891" cy="830997"/>
           </a:xfrm>
           <a:prstGeom prst="rect">
@@ -8255,7 +8111,7 @@
           <a:lstStyle/>
           <a:p>
             <a:r>
-              <a:rPr lang="en-IN" sz="4800" dirty="0">
+              <a:rPr lang="en-IN" sz="4800" dirty="0" smtClean="0">
                 <a:solidFill>
                   <a:schemeClr val="accent5">
                     <a:lumMod val="20000"/>
@@ -8264,17 +8120,26 @@
                 </a:solidFill>
                 <a:latin typeface="Lato Black" panose="020F0A02020204030203" pitchFamily="34" charset="0"/>
               </a:rPr>
-              <a:t>MS SQL SERVER</a:t>
-            </a:r>
+              <a:t>MYSQL</a:t>
+            </a:r>
+            <a:endParaRPr lang="en-IN" sz="4800" dirty="0">
+              <a:solidFill>
+                <a:schemeClr val="accent5">
+                  <a:lumMod val="20000"/>
+                  <a:lumOff val="80000"/>
+                </a:schemeClr>
+              </a:solidFill>
+              <a:latin typeface="Lato Black" panose="020F0A02020204030203" pitchFamily="34" charset="0"/>
+            </a:endParaRPr>
           </a:p>
         </p:txBody>
       </p:sp>
       <p:pic>
         <p:nvPicPr>
-          <p:cNvPr id="5" name="Picture 12" descr="Sql server - Free logo icons">
-            <a:extLst>
-              <a:ext uri="{FF2B5EF4-FFF2-40B4-BE49-F238E27FC236}">
-                <a16:creationId xmlns:a16="http://schemas.microsoft.com/office/drawing/2014/main" id="{A5FA9380-85A3-5EB1-2C9B-1C4ABB8EF8FD}"/>
+          <p:cNvPr id="6" name="Picture 14" descr="Logo Mysql PNG Images, Free Download - Free Transparent PNG Logos">
+            <a:extLst>
+              <a:ext uri="{FF2B5EF4-FFF2-40B4-BE49-F238E27FC236}">
+                <a16:creationId xmlns="" xmlns:a16="http://schemas.microsoft.com/office/drawing/2014/main" id="{3E80D00F-6EA5-9A4C-EC8A-63F38E357D66}"/>
               </a:ext>
             </a:extLst>
           </p:cNvPr>
@@ -8284,14 +8149,7 @@
           <p:nvPr/>
         </p:nvPicPr>
         <p:blipFill>
-          <a:blip r:embed="rId3">
-            <a:duotone>
-              <a:schemeClr val="accent4">
-                <a:shade val="45000"/>
-                <a:satMod val="135000"/>
-              </a:schemeClr>
-              <a:prstClr val="white"/>
-            </a:duotone>
+          <a:blip r:embed="rId3" cstate="print">
             <a:extLst>
               <a:ext uri="{28A0092B-C50C-407E-A947-70E740481C1C}">
                 <a14:useLocalDpi xmlns:a14="http://schemas.microsoft.com/office/drawing/2010/main" val="0"/>
@@ -8305,8 +8163,8 @@
         </p:blipFill>
         <p:spPr bwMode="auto">
           <a:xfrm>
-            <a:off x="1548079" y="171703"/>
-            <a:ext cx="779253" cy="779253"/>
+            <a:off x="953663" y="214394"/>
+            <a:ext cx="620658" cy="651103"/>
           </a:xfrm>
           <a:prstGeom prst="rect">
             <a:avLst/>
@@ -8325,57 +8183,10 @@
       </p:pic>
       <p:pic>
         <p:nvPicPr>
-          <p:cNvPr id="6" name="Picture 14" descr="Logo Mysql PNG Images, Free Download - Free Transparent PNG Logos">
-            <a:extLst>
-              <a:ext uri="{FF2B5EF4-FFF2-40B4-BE49-F238E27FC236}">
-                <a16:creationId xmlns:a16="http://schemas.microsoft.com/office/drawing/2014/main" id="{3E80D00F-6EA5-9A4C-EC8A-63F38E357D66}"/>
-              </a:ext>
-            </a:extLst>
-          </p:cNvPr>
-          <p:cNvPicPr>
-            <a:picLocks noChangeAspect="1" noChangeArrowheads="1"/>
-          </p:cNvPicPr>
-          <p:nvPr/>
-        </p:nvPicPr>
-        <p:blipFill>
-          <a:blip r:embed="rId4">
-            <a:extLst>
-              <a:ext uri="{28A0092B-C50C-407E-A947-70E740481C1C}">
-                <a14:useLocalDpi xmlns:a14="http://schemas.microsoft.com/office/drawing/2010/main" val="0"/>
-              </a:ext>
-            </a:extLst>
-          </a:blip>
-          <a:srcRect/>
-          <a:stretch>
-            <a:fillRect/>
-          </a:stretch>
-        </p:blipFill>
-        <p:spPr bwMode="auto">
-          <a:xfrm>
-            <a:off x="651018" y="251038"/>
-            <a:ext cx="620658" cy="651103"/>
-          </a:xfrm>
-          <a:prstGeom prst="rect">
-            <a:avLst/>
-          </a:prstGeom>
-          <a:noFill/>
-          <a:extLst>
-            <a:ext uri="{909E8E84-426E-40DD-AFC4-6F175D3DCCD1}">
-              <a14:hiddenFill xmlns:a14="http://schemas.microsoft.com/office/drawing/2010/main">
-                <a:solidFill>
-                  <a:srgbClr val="FFFFFF"/>
-                </a:solidFill>
-              </a14:hiddenFill>
-            </a:ext>
-          </a:extLst>
-        </p:spPr>
-      </p:pic>
-      <p:pic>
-        <p:nvPicPr>
           <p:cNvPr id="7" name="Picture 6">
             <a:extLst>
               <a:ext uri="{FF2B5EF4-FFF2-40B4-BE49-F238E27FC236}">
-                <a16:creationId xmlns:a16="http://schemas.microsoft.com/office/drawing/2014/main" id="{01A6FD57-88FE-9417-94A8-05E1D5F38AFB}"/>
+                <a16:creationId xmlns="" xmlns:a16="http://schemas.microsoft.com/office/drawing/2014/main" id="{01A6FD57-88FE-9417-94A8-05E1D5F38AFB}"/>
               </a:ext>
             </a:extLst>
           </p:cNvPr>
@@ -8385,7 +8196,7 @@
           <p:nvPr/>
         </p:nvPicPr>
         <p:blipFill>
-          <a:blip r:embed="rId5"/>
+          <a:blip r:embed="rId4"/>
           <a:stretch>
             <a:fillRect/>
           </a:stretch>
@@ -8448,7 +8259,7 @@
           <p:cNvPr id="3" name="Picture 2">
             <a:extLst>
               <a:ext uri="{FF2B5EF4-FFF2-40B4-BE49-F238E27FC236}">
-                <a16:creationId xmlns:a16="http://schemas.microsoft.com/office/drawing/2014/main" id="{A7B21A84-16ED-E315-0365-C99EA56D3865}"/>
+                <a16:creationId xmlns="" xmlns:a16="http://schemas.microsoft.com/office/drawing/2014/main" id="{A7B21A84-16ED-E315-0365-C99EA56D3865}"/>
               </a:ext>
             </a:extLst>
           </p:cNvPr>
@@ -8478,7 +8289,7 @@
           <p:cNvPr id="7" name="TextBox 6">
             <a:extLst>
               <a:ext uri="{FF2B5EF4-FFF2-40B4-BE49-F238E27FC236}">
-                <a16:creationId xmlns:a16="http://schemas.microsoft.com/office/drawing/2014/main" id="{98B2E6D4-5C36-6630-22D9-2DE480A57460}"/>
+                <a16:creationId xmlns="" xmlns:a16="http://schemas.microsoft.com/office/drawing/2014/main" id="{98B2E6D4-5C36-6630-22D9-2DE480A57460}"/>
               </a:ext>
             </a:extLst>
           </p:cNvPr>
@@ -8522,7 +8333,7 @@
           <p:cNvPr id="8" name="Picture 7">
             <a:extLst>
               <a:ext uri="{FF2B5EF4-FFF2-40B4-BE49-F238E27FC236}">
-                <a16:creationId xmlns:a16="http://schemas.microsoft.com/office/drawing/2014/main" id="{126798A0-186C-3BE6-84AB-0BA49EB106BB}"/>
+                <a16:creationId xmlns="" xmlns:a16="http://schemas.microsoft.com/office/drawing/2014/main" id="{126798A0-186C-3BE6-84AB-0BA49EB106BB}"/>
               </a:ext>
             </a:extLst>
           </p:cNvPr>
@@ -8532,7 +8343,7 @@
           <p:nvPr/>
         </p:nvPicPr>
         <p:blipFill>
-          <a:blip r:embed="rId3">
+          <a:blip r:embed="rId3" cstate="print">
             <a:extLst>
               <a:ext uri="{28A0092B-C50C-407E-A947-70E740481C1C}">
                 <a14:useLocalDpi xmlns:a14="http://schemas.microsoft.com/office/drawing/2010/main" val="0"/>
@@ -8565,7 +8376,7 @@
           <p:cNvPr id="9" name="TextBox 8">
             <a:extLst>
               <a:ext uri="{FF2B5EF4-FFF2-40B4-BE49-F238E27FC236}">
-                <a16:creationId xmlns:a16="http://schemas.microsoft.com/office/drawing/2014/main" id="{7B857CFF-1124-05A4-7DD1-784492F973DC}"/>
+                <a16:creationId xmlns="" xmlns:a16="http://schemas.microsoft.com/office/drawing/2014/main" id="{7B857CFF-1124-05A4-7DD1-784492F973DC}"/>
               </a:ext>
             </a:extLst>
           </p:cNvPr>
@@ -8608,7 +8419,7 @@
           <p:cNvPr id="10" name="TextBox 9">
             <a:extLst>
               <a:ext uri="{FF2B5EF4-FFF2-40B4-BE49-F238E27FC236}">
-                <a16:creationId xmlns:a16="http://schemas.microsoft.com/office/drawing/2014/main" id="{2FB230D0-E6A4-BA14-A14A-48AC7409EDA1}"/>
+                <a16:creationId xmlns="" xmlns:a16="http://schemas.microsoft.com/office/drawing/2014/main" id="{2FB230D0-E6A4-BA14-A14A-48AC7409EDA1}"/>
               </a:ext>
             </a:extLst>
           </p:cNvPr>
@@ -8648,7 +8459,7 @@
           <p:cNvPr id="11" name="TextBox 10">
             <a:extLst>
               <a:ext uri="{FF2B5EF4-FFF2-40B4-BE49-F238E27FC236}">
-                <a16:creationId xmlns:a16="http://schemas.microsoft.com/office/drawing/2014/main" id="{34EEA4A0-4AF0-B634-EFAA-19F25C170AAC}"/>
+                <a16:creationId xmlns="" xmlns:a16="http://schemas.microsoft.com/office/drawing/2014/main" id="{34EEA4A0-4AF0-B634-EFAA-19F25C170AAC}"/>
               </a:ext>
             </a:extLst>
           </p:cNvPr>
@@ -8688,7 +8499,7 @@
           <p:cNvPr id="12" name="Picture 11">
             <a:extLst>
               <a:ext uri="{FF2B5EF4-FFF2-40B4-BE49-F238E27FC236}">
-                <a16:creationId xmlns:a16="http://schemas.microsoft.com/office/drawing/2014/main" id="{1E8BEBC9-98D8-041D-95F3-3951B265A9B6}"/>
+                <a16:creationId xmlns="" xmlns:a16="http://schemas.microsoft.com/office/drawing/2014/main" id="{1E8BEBC9-98D8-041D-95F3-3951B265A9B6}"/>
               </a:ext>
             </a:extLst>
           </p:cNvPr>
@@ -8698,7 +8509,7 @@
           <p:nvPr/>
         </p:nvPicPr>
         <p:blipFill>
-          <a:blip r:embed="rId4">
+          <a:blip r:embed="rId4" cstate="print">
             <a:duotone>
               <a:prstClr val="black"/>
               <a:schemeClr val="accent4">
@@ -8774,7 +8585,7 @@
           <p:cNvPr id="13" name="TextBox 12">
             <a:extLst>
               <a:ext uri="{FF2B5EF4-FFF2-40B4-BE49-F238E27FC236}">
-                <a16:creationId xmlns:a16="http://schemas.microsoft.com/office/drawing/2014/main" id="{EFD37F5C-B498-7E9E-7268-B898BED7C5C1}"/>
+                <a16:creationId xmlns="" xmlns:a16="http://schemas.microsoft.com/office/drawing/2014/main" id="{EFD37F5C-B498-7E9E-7268-B898BED7C5C1}"/>
               </a:ext>
             </a:extLst>
           </p:cNvPr>
@@ -8815,7 +8626,7 @@
           <p:cNvPr id="17" name="TextBox 16">
             <a:extLst>
               <a:ext uri="{FF2B5EF4-FFF2-40B4-BE49-F238E27FC236}">
-                <a16:creationId xmlns:a16="http://schemas.microsoft.com/office/drawing/2014/main" id="{23AE5A38-1C90-91C3-C264-017362FE588D}"/>
+                <a16:creationId xmlns="" xmlns:a16="http://schemas.microsoft.com/office/drawing/2014/main" id="{23AE5A38-1C90-91C3-C264-017362FE588D}"/>
               </a:ext>
             </a:extLst>
           </p:cNvPr>
@@ -8855,7 +8666,7 @@
           <p:cNvPr id="18" name="TextBox 17">
             <a:extLst>
               <a:ext uri="{FF2B5EF4-FFF2-40B4-BE49-F238E27FC236}">
-                <a16:creationId xmlns:a16="http://schemas.microsoft.com/office/drawing/2014/main" id="{01F6CB98-36C5-38E5-0DF0-29D3168418DC}"/>
+                <a16:creationId xmlns="" xmlns:a16="http://schemas.microsoft.com/office/drawing/2014/main" id="{01F6CB98-36C5-38E5-0DF0-29D3168418DC}"/>
               </a:ext>
             </a:extLst>
           </p:cNvPr>
@@ -8905,7 +8716,7 @@
           <p:cNvPr id="19" name="TextBox 18">
             <a:extLst>
               <a:ext uri="{FF2B5EF4-FFF2-40B4-BE49-F238E27FC236}">
-                <a16:creationId xmlns:a16="http://schemas.microsoft.com/office/drawing/2014/main" id="{E8907EC3-CB54-081F-6806-59FB3EDC3F65}"/>
+                <a16:creationId xmlns="" xmlns:a16="http://schemas.microsoft.com/office/drawing/2014/main" id="{E8907EC3-CB54-081F-6806-59FB3EDC3F65}"/>
               </a:ext>
             </a:extLst>
           </p:cNvPr>
@@ -8946,7 +8757,7 @@
           <p:cNvPr id="20" name="Picture 19">
             <a:extLst>
               <a:ext uri="{FF2B5EF4-FFF2-40B4-BE49-F238E27FC236}">
-                <a16:creationId xmlns:a16="http://schemas.microsoft.com/office/drawing/2014/main" id="{FE325C91-5367-908E-9FBA-338517C802F7}"/>
+                <a16:creationId xmlns="" xmlns:a16="http://schemas.microsoft.com/office/drawing/2014/main" id="{FE325C91-5367-908E-9FBA-338517C802F7}"/>
               </a:ext>
             </a:extLst>
           </p:cNvPr>
@@ -8956,7 +8767,7 @@
           <p:nvPr/>
         </p:nvPicPr>
         <p:blipFill>
-          <a:blip r:embed="rId2">
+          <a:blip r:embed="rId2" cstate="print">
             <a:duotone>
               <a:prstClr val="black"/>
               <a:schemeClr val="accent4">
@@ -8989,7 +8800,7 @@
           <p:cNvPr id="2" name="Picture 1">
             <a:extLst>
               <a:ext uri="{FF2B5EF4-FFF2-40B4-BE49-F238E27FC236}">
-                <a16:creationId xmlns:a16="http://schemas.microsoft.com/office/drawing/2014/main" id="{B565E50B-F93A-78F0-AFD4-036E6BED0EB1}"/>
+                <a16:creationId xmlns="" xmlns:a16="http://schemas.microsoft.com/office/drawing/2014/main" id="{B565E50B-F93A-78F0-AFD4-036E6BED0EB1}"/>
               </a:ext>
             </a:extLst>
           </p:cNvPr>
@@ -8999,7 +8810,7 @@
           <p:nvPr/>
         </p:nvPicPr>
         <p:blipFill>
-          <a:blip r:embed="rId3">
+          <a:blip r:embed="rId3" cstate="print">
             <a:extLst>
               <a:ext uri="{28A0092B-C50C-407E-A947-70E740481C1C}">
                 <a14:useLocalDpi xmlns:a14="http://schemas.microsoft.com/office/drawing/2010/main" val="0"/>
@@ -9068,7 +8879,7 @@
           <p:cNvPr id="20" name="Picture 19">
             <a:extLst>
               <a:ext uri="{FF2B5EF4-FFF2-40B4-BE49-F238E27FC236}">
-                <a16:creationId xmlns:a16="http://schemas.microsoft.com/office/drawing/2014/main" id="{FE325C91-5367-908E-9FBA-338517C802F7}"/>
+                <a16:creationId xmlns="" xmlns:a16="http://schemas.microsoft.com/office/drawing/2014/main" id="{FE325C91-5367-908E-9FBA-338517C802F7}"/>
               </a:ext>
             </a:extLst>
           </p:cNvPr>
@@ -9078,7 +8889,7 @@
           <p:nvPr/>
         </p:nvPicPr>
         <p:blipFill>
-          <a:blip r:embed="rId2">
+          <a:blip r:embed="rId2" cstate="print">
             <a:duotone>
               <a:prstClr val="black"/>
               <a:schemeClr val="accent4">
@@ -9111,7 +8922,7 @@
           <p:cNvPr id="2" name="TextBox 1">
             <a:extLst>
               <a:ext uri="{FF2B5EF4-FFF2-40B4-BE49-F238E27FC236}">
-                <a16:creationId xmlns:a16="http://schemas.microsoft.com/office/drawing/2014/main" id="{BE5492AE-9AD7-DEAB-9741-FFEB9D5B71D4}"/>
+                <a16:creationId xmlns="" xmlns:a16="http://schemas.microsoft.com/office/drawing/2014/main" id="{BE5492AE-9AD7-DEAB-9741-FFEB9D5B71D4}"/>
               </a:ext>
             </a:extLst>
           </p:cNvPr>
@@ -9155,7 +8966,7 @@
           <p:cNvPr id="3" name="TextBox 2">
             <a:extLst>
               <a:ext uri="{FF2B5EF4-FFF2-40B4-BE49-F238E27FC236}">
-                <a16:creationId xmlns:a16="http://schemas.microsoft.com/office/drawing/2014/main" id="{F2B21082-DB76-800E-F7F3-8336A6EA7FD6}"/>
+                <a16:creationId xmlns="" xmlns:a16="http://schemas.microsoft.com/office/drawing/2014/main" id="{F2B21082-DB76-800E-F7F3-8336A6EA7FD6}"/>
               </a:ext>
             </a:extLst>
           </p:cNvPr>
@@ -9200,7 +9011,7 @@
           <p:cNvPr id="4" name="Picture 12" descr="Sql server - Free logo icons">
             <a:extLst>
               <a:ext uri="{FF2B5EF4-FFF2-40B4-BE49-F238E27FC236}">
-                <a16:creationId xmlns:a16="http://schemas.microsoft.com/office/drawing/2014/main" id="{530262F7-0CF1-8814-2372-D74F015AA73E}"/>
+                <a16:creationId xmlns="" xmlns:a16="http://schemas.microsoft.com/office/drawing/2014/main" id="{530262F7-0CF1-8814-2372-D74F015AA73E}"/>
               </a:ext>
             </a:extLst>
           </p:cNvPr>
@@ -9257,7 +9068,7 @@
           <p:cNvPr id="5" name="Picture 4" descr="Plugs connection outline symbol in a circle - Free interface icons">
             <a:extLst>
               <a:ext uri="{FF2B5EF4-FFF2-40B4-BE49-F238E27FC236}">
-                <a16:creationId xmlns:a16="http://schemas.microsoft.com/office/drawing/2014/main" id="{D843DAAA-B6CB-2BDC-8B67-6C86E9DBE4D3}"/>
+                <a16:creationId xmlns="" xmlns:a16="http://schemas.microsoft.com/office/drawing/2014/main" id="{D843DAAA-B6CB-2BDC-8B67-6C86E9DBE4D3}"/>
               </a:ext>
             </a:extLst>
           </p:cNvPr>
@@ -9309,7 +9120,7 @@
           <p:cNvPr id="6" name="Picture 4" descr="Plugs connection outline symbol in a circle - Free interface icons">
             <a:extLst>
               <a:ext uri="{FF2B5EF4-FFF2-40B4-BE49-F238E27FC236}">
-                <a16:creationId xmlns:a16="http://schemas.microsoft.com/office/drawing/2014/main" id="{E6AE5A0C-BEA4-521E-FE4C-84F4DDA317BD}"/>
+                <a16:creationId xmlns="" xmlns:a16="http://schemas.microsoft.com/office/drawing/2014/main" id="{E6AE5A0C-BEA4-521E-FE4C-84F4DDA317BD}"/>
               </a:ext>
             </a:extLst>
           </p:cNvPr>
@@ -9361,7 +9172,7 @@
           <p:cNvPr id="7" name="Picture 6">
             <a:extLst>
               <a:ext uri="{FF2B5EF4-FFF2-40B4-BE49-F238E27FC236}">
-                <a16:creationId xmlns:a16="http://schemas.microsoft.com/office/drawing/2014/main" id="{461A663B-B474-C93D-79E3-4C1BA09D561F}"/>
+                <a16:creationId xmlns="" xmlns:a16="http://schemas.microsoft.com/office/drawing/2014/main" id="{461A663B-B474-C93D-79E3-4C1BA09D561F}"/>
               </a:ext>
             </a:extLst>
           </p:cNvPr>
@@ -9371,7 +9182,7 @@
           <p:nvPr/>
         </p:nvPicPr>
         <p:blipFill>
-          <a:blip r:embed="rId6">
+          <a:blip r:embed="rId6" cstate="print">
             <a:extLst>
               <a:ext uri="{28A0092B-C50C-407E-A947-70E740481C1C}">
                 <a14:useLocalDpi xmlns:a14="http://schemas.microsoft.com/office/drawing/2010/main" val="0"/>
@@ -9397,7 +9208,7 @@
           <p:cNvPr id="8" name="Group 7">
             <a:extLst>
               <a:ext uri="{FF2B5EF4-FFF2-40B4-BE49-F238E27FC236}">
-                <a16:creationId xmlns:a16="http://schemas.microsoft.com/office/drawing/2014/main" id="{4D6708C9-92D4-A8AB-D92C-7739A128687A}"/>
+                <a16:creationId xmlns="" xmlns:a16="http://schemas.microsoft.com/office/drawing/2014/main" id="{4D6708C9-92D4-A8AB-D92C-7739A128687A}"/>
               </a:ext>
             </a:extLst>
           </p:cNvPr>
@@ -9417,7 +9228,7 @@
             <p:cNvPr id="9" name="TextBox 8">
               <a:extLst>
                 <a:ext uri="{FF2B5EF4-FFF2-40B4-BE49-F238E27FC236}">
-                  <a16:creationId xmlns:a16="http://schemas.microsoft.com/office/drawing/2014/main" id="{105B791A-4265-ACD2-ED42-7D2A386E758E}"/>
+                  <a16:creationId xmlns="" xmlns:a16="http://schemas.microsoft.com/office/drawing/2014/main" id="{105B791A-4265-ACD2-ED42-7D2A386E758E}"/>
                 </a:ext>
               </a:extLst>
             </p:cNvPr>
@@ -9457,7 +9268,7 @@
             <p:cNvPr id="10" name="Picture 9">
               <a:extLst>
                 <a:ext uri="{FF2B5EF4-FFF2-40B4-BE49-F238E27FC236}">
-                  <a16:creationId xmlns:a16="http://schemas.microsoft.com/office/drawing/2014/main" id="{CB691991-C41B-CFEF-7AEE-431CB4C11ACB}"/>
+                  <a16:creationId xmlns="" xmlns:a16="http://schemas.microsoft.com/office/drawing/2014/main" id="{CB691991-C41B-CFEF-7AEE-431CB4C11ACB}"/>
                 </a:ext>
               </a:extLst>
             </p:cNvPr>
@@ -9467,7 +9278,7 @@
             <p:nvPr/>
           </p:nvPicPr>
           <p:blipFill>
-            <a:blip r:embed="rId6">
+            <a:blip r:embed="rId6" cstate="print">
               <a:extLst>
                 <a:ext uri="{28A0092B-C50C-407E-A947-70E740481C1C}">
                   <a14:useLocalDpi xmlns:a14="http://schemas.microsoft.com/office/drawing/2010/main" val="0"/>
@@ -9537,7 +9348,7 @@
           <p:cNvPr id="5" name="TextBox 4">
             <a:extLst>
               <a:ext uri="{FF2B5EF4-FFF2-40B4-BE49-F238E27FC236}">
-                <a16:creationId xmlns:a16="http://schemas.microsoft.com/office/drawing/2014/main" id="{CB8C99B5-5307-E4E4-0E72-DE3504B0A583}"/>
+                <a16:creationId xmlns="" xmlns:a16="http://schemas.microsoft.com/office/drawing/2014/main" id="{CB8C99B5-5307-E4E4-0E72-DE3504B0A583}"/>
               </a:ext>
             </a:extLst>
           </p:cNvPr>
@@ -9579,7 +9390,7 @@
           <p:cNvPr id="6" name="Picture 5">
             <a:extLst>
               <a:ext uri="{FF2B5EF4-FFF2-40B4-BE49-F238E27FC236}">
-                <a16:creationId xmlns:a16="http://schemas.microsoft.com/office/drawing/2014/main" id="{EE843937-0252-6408-B4D5-06B6D9531E56}"/>
+                <a16:creationId xmlns="" xmlns:a16="http://schemas.microsoft.com/office/drawing/2014/main" id="{EE843937-0252-6408-B4D5-06B6D9531E56}"/>
               </a:ext>
             </a:extLst>
           </p:cNvPr>
@@ -9589,7 +9400,7 @@
           <p:nvPr/>
         </p:nvPicPr>
         <p:blipFill>
-          <a:blip r:embed="rId2">
+          <a:blip r:embed="rId2" cstate="print">
             <a:extLst>
               <a:ext uri="{28A0092B-C50C-407E-A947-70E740481C1C}">
                 <a14:useLocalDpi xmlns:a14="http://schemas.microsoft.com/office/drawing/2010/main" val="0"/>
@@ -9616,7 +9427,7 @@
           <p:cNvPr id="8" name="Picture 7">
             <a:extLst>
               <a:ext uri="{FF2B5EF4-FFF2-40B4-BE49-F238E27FC236}">
-                <a16:creationId xmlns:a16="http://schemas.microsoft.com/office/drawing/2014/main" id="{D0964A68-B481-FDBC-FBB9-52425E65C659}"/>
+                <a16:creationId xmlns="" xmlns:a16="http://schemas.microsoft.com/office/drawing/2014/main" id="{D0964A68-B481-FDBC-FBB9-52425E65C659}"/>
               </a:ext>
             </a:extLst>
           </p:cNvPr>
@@ -9646,7 +9457,7 @@
           <p:cNvPr id="9" name="Picture 8">
             <a:extLst>
               <a:ext uri="{FF2B5EF4-FFF2-40B4-BE49-F238E27FC236}">
-                <a16:creationId xmlns:a16="http://schemas.microsoft.com/office/drawing/2014/main" id="{61182BE8-DA25-2F0A-6FC9-D781928C7BD4}"/>
+                <a16:creationId xmlns="" xmlns:a16="http://schemas.microsoft.com/office/drawing/2014/main" id="{61182BE8-DA25-2F0A-6FC9-D781928C7BD4}"/>
               </a:ext>
             </a:extLst>
           </p:cNvPr>
@@ -9656,7 +9467,7 @@
           <p:nvPr/>
         </p:nvPicPr>
         <p:blipFill>
-          <a:blip r:embed="rId4">
+          <a:blip r:embed="rId4" cstate="print">
             <a:duotone>
               <a:prstClr val="black"/>
               <a:schemeClr val="accent4">
@@ -9732,7 +9543,7 @@
           <p:cNvPr id="5" name="TextBox 4">
             <a:extLst>
               <a:ext uri="{FF2B5EF4-FFF2-40B4-BE49-F238E27FC236}">
-                <a16:creationId xmlns:a16="http://schemas.microsoft.com/office/drawing/2014/main" id="{CB8C99B5-5307-E4E4-0E72-DE3504B0A583}"/>
+                <a16:creationId xmlns="" xmlns:a16="http://schemas.microsoft.com/office/drawing/2014/main" id="{CB8C99B5-5307-E4E4-0E72-DE3504B0A583}"/>
               </a:ext>
             </a:extLst>
           </p:cNvPr>
@@ -9774,7 +9585,7 @@
           <p:cNvPr id="6" name="Picture 5">
             <a:extLst>
               <a:ext uri="{FF2B5EF4-FFF2-40B4-BE49-F238E27FC236}">
-                <a16:creationId xmlns:a16="http://schemas.microsoft.com/office/drawing/2014/main" id="{EE843937-0252-6408-B4D5-06B6D9531E56}"/>
+                <a16:creationId xmlns="" xmlns:a16="http://schemas.microsoft.com/office/drawing/2014/main" id="{EE843937-0252-6408-B4D5-06B6D9531E56}"/>
               </a:ext>
             </a:extLst>
           </p:cNvPr>
@@ -9784,7 +9595,7 @@
           <p:nvPr/>
         </p:nvPicPr>
         <p:blipFill>
-          <a:blip r:embed="rId2">
+          <a:blip r:embed="rId2" cstate="print">
             <a:extLst>
               <a:ext uri="{28A0092B-C50C-407E-A947-70E740481C1C}">
                 <a14:useLocalDpi xmlns:a14="http://schemas.microsoft.com/office/drawing/2010/main" val="0"/>
@@ -9811,7 +9622,7 @@
           <p:cNvPr id="3" name="Picture 2">
             <a:extLst>
               <a:ext uri="{FF2B5EF4-FFF2-40B4-BE49-F238E27FC236}">
-                <a16:creationId xmlns:a16="http://schemas.microsoft.com/office/drawing/2014/main" id="{73AA4628-0EE3-7EC4-C370-2A0B2BE6484D}"/>
+                <a16:creationId xmlns="" xmlns:a16="http://schemas.microsoft.com/office/drawing/2014/main" id="{73AA4628-0EE3-7EC4-C370-2A0B2BE6484D}"/>
               </a:ext>
             </a:extLst>
           </p:cNvPr>
@@ -9841,7 +9652,7 @@
           <p:cNvPr id="4" name="Picture 3">
             <a:extLst>
               <a:ext uri="{FF2B5EF4-FFF2-40B4-BE49-F238E27FC236}">
-                <a16:creationId xmlns:a16="http://schemas.microsoft.com/office/drawing/2014/main" id="{DF94FEC7-38DB-BB24-114F-273EF90A7BB5}"/>
+                <a16:creationId xmlns="" xmlns:a16="http://schemas.microsoft.com/office/drawing/2014/main" id="{DF94FEC7-38DB-BB24-114F-273EF90A7BB5}"/>
               </a:ext>
             </a:extLst>
           </p:cNvPr>
@@ -9851,7 +9662,7 @@
           <p:nvPr/>
         </p:nvPicPr>
         <p:blipFill>
-          <a:blip r:embed="rId4">
+          <a:blip r:embed="rId4" cstate="print">
             <a:duotone>
               <a:prstClr val="black"/>
               <a:schemeClr val="accent4">

</xml_diff>